<commit_message>
docs(jaehoo1) : ppt 수정
</commit_message>
<xml_diff>
--- a/10. 전역 변수의 문제점/presentation10/Alisherka7/전역 변수의 문제점 - 알레셰르.pptx
+++ b/10. 전역 변수의 문제점/presentation10/Alisherka7/전역 변수의 문제점 - 알레셰르.pptx
@@ -16,25 +16,27 @@
     <p:sldId id="309" r:id="rId10"/>
     <p:sldId id="310" r:id="rId11"/>
     <p:sldId id="311" r:id="rId12"/>
-    <p:sldId id="302" r:id="rId13"/>
-    <p:sldId id="303" r:id="rId14"/>
-    <p:sldId id="265" r:id="rId15"/>
+    <p:sldId id="265" r:id="rId13"/>
   </p:sldIdLst>
   <p:sldSz cx="12192000" cy="6858000"/>
   <p:notesSz cx="6858000" cy="9144000"/>
   <p:embeddedFontLst>
     <p:embeddedFont>
-      <p:font typeface="맑은 고딕" panose="020B0503020000020004" pitchFamily="34" charset="-127"/>
-      <p:regular r:id="rId16"/>
-      <p:bold r:id="rId17"/>
+      <p:font typeface="나눔스퀘어" panose="020B0600000101010101" pitchFamily="50" charset="-127"/>
+      <p:regular r:id="rId14"/>
     </p:embeddedFont>
     <p:embeddedFont>
-      <p:font typeface="나눔스퀘어 Bold" panose="020B0600000101010101" pitchFamily="34" charset="-127"/>
-      <p:bold r:id="rId18"/>
+      <p:font typeface="나눔스퀘어 Bold" panose="020B0600000101010101" pitchFamily="50" charset="-127"/>
+      <p:bold r:id="rId15"/>
     </p:embeddedFont>
     <p:embeddedFont>
-      <p:font typeface="나눔스퀘어 ExtraBold" panose="020B0600000101010101" pitchFamily="34" charset="-127"/>
-      <p:bold r:id="rId19"/>
+      <p:font typeface="나눔스퀘어 ExtraBold" panose="020B0600000101010101" pitchFamily="50" charset="-127"/>
+      <p:bold r:id="rId16"/>
+    </p:embeddedFont>
+    <p:embeddedFont>
+      <p:font typeface="맑은 고딕" panose="020B0503020000020004" pitchFamily="50" charset="-127"/>
+      <p:regular r:id="rId17"/>
+      <p:bold r:id="rId18"/>
     </p:embeddedFont>
   </p:embeddedFontLst>
   <p:defaultTextStyle>
@@ -293,7 +295,7 @@
           <a:p>
             <a:fld id="{BF6E7CB9-552A-40FD-8E25-6C9525410464}" type="datetimeFigureOut">
               <a:rPr lang="ko-KR" altLang="en-US" smtClean="0"/>
-              <a:t>2022. 11. 8.</a:t>
+              <a:t>2022-11-08</a:t>
             </a:fld>
             <a:endParaRPr lang="ko-KR" altLang="en-US"/>
           </a:p>
@@ -491,7 +493,7 @@
           <a:p>
             <a:fld id="{BF6E7CB9-552A-40FD-8E25-6C9525410464}" type="datetimeFigureOut">
               <a:rPr lang="ko-KR" altLang="en-US" smtClean="0"/>
-              <a:t>2022. 11. 8.</a:t>
+              <a:t>2022-11-08</a:t>
             </a:fld>
             <a:endParaRPr lang="ko-KR" altLang="en-US"/>
           </a:p>
@@ -699,7 +701,7 @@
           <a:p>
             <a:fld id="{BF6E7CB9-552A-40FD-8E25-6C9525410464}" type="datetimeFigureOut">
               <a:rPr lang="ko-KR" altLang="en-US" smtClean="0"/>
-              <a:t>2022. 11. 8.</a:t>
+              <a:t>2022-11-08</a:t>
             </a:fld>
             <a:endParaRPr lang="ko-KR" altLang="en-US"/>
           </a:p>
@@ -897,7 +899,7 @@
           <a:p>
             <a:fld id="{BF6E7CB9-552A-40FD-8E25-6C9525410464}" type="datetimeFigureOut">
               <a:rPr lang="ko-KR" altLang="en-US" smtClean="0"/>
-              <a:t>2022. 11. 8.</a:t>
+              <a:t>2022-11-08</a:t>
             </a:fld>
             <a:endParaRPr lang="ko-KR" altLang="en-US"/>
           </a:p>
@@ -1172,7 +1174,7 @@
           <a:p>
             <a:fld id="{BF6E7CB9-552A-40FD-8E25-6C9525410464}" type="datetimeFigureOut">
               <a:rPr lang="ko-KR" altLang="en-US" smtClean="0"/>
-              <a:t>2022. 11. 8.</a:t>
+              <a:t>2022-11-08</a:t>
             </a:fld>
             <a:endParaRPr lang="ko-KR" altLang="en-US"/>
           </a:p>
@@ -1437,7 +1439,7 @@
           <a:p>
             <a:fld id="{BF6E7CB9-552A-40FD-8E25-6C9525410464}" type="datetimeFigureOut">
               <a:rPr lang="ko-KR" altLang="en-US" smtClean="0"/>
-              <a:t>2022. 11. 8.</a:t>
+              <a:t>2022-11-08</a:t>
             </a:fld>
             <a:endParaRPr lang="ko-KR" altLang="en-US"/>
           </a:p>
@@ -1849,7 +1851,7 @@
           <a:p>
             <a:fld id="{BF6E7CB9-552A-40FD-8E25-6C9525410464}" type="datetimeFigureOut">
               <a:rPr lang="ko-KR" altLang="en-US" smtClean="0"/>
-              <a:t>2022. 11. 8.</a:t>
+              <a:t>2022-11-08</a:t>
             </a:fld>
             <a:endParaRPr lang="ko-KR" altLang="en-US"/>
           </a:p>
@@ -1990,7 +1992,7 @@
           <a:p>
             <a:fld id="{BF6E7CB9-552A-40FD-8E25-6C9525410464}" type="datetimeFigureOut">
               <a:rPr lang="ko-KR" altLang="en-US" smtClean="0"/>
-              <a:t>2022. 11. 8.</a:t>
+              <a:t>2022-11-08</a:t>
             </a:fld>
             <a:endParaRPr lang="ko-KR" altLang="en-US"/>
           </a:p>
@@ -2103,7 +2105,7 @@
           <a:p>
             <a:fld id="{BF6E7CB9-552A-40FD-8E25-6C9525410464}" type="datetimeFigureOut">
               <a:rPr lang="ko-KR" altLang="en-US" smtClean="0"/>
-              <a:t>2022. 11. 8.</a:t>
+              <a:t>2022-11-08</a:t>
             </a:fld>
             <a:endParaRPr lang="ko-KR" altLang="en-US"/>
           </a:p>
@@ -2414,7 +2416,7 @@
           <a:p>
             <a:fld id="{BF6E7CB9-552A-40FD-8E25-6C9525410464}" type="datetimeFigureOut">
               <a:rPr lang="ko-KR" altLang="en-US" smtClean="0"/>
-              <a:t>2022. 11. 8.</a:t>
+              <a:t>2022-11-08</a:t>
             </a:fld>
             <a:endParaRPr lang="ko-KR" altLang="en-US"/>
           </a:p>
@@ -2702,7 +2704,7 @@
           <a:p>
             <a:fld id="{BF6E7CB9-552A-40FD-8E25-6C9525410464}" type="datetimeFigureOut">
               <a:rPr lang="ko-KR" altLang="en-US" smtClean="0"/>
-              <a:t>2022. 11. 8.</a:t>
+              <a:t>2022-11-08</a:t>
             </a:fld>
             <a:endParaRPr lang="ko-KR" altLang="en-US"/>
           </a:p>
@@ -2946,7 +2948,7 @@
           <a:p>
             <a:fld id="{BF6E7CB9-552A-40FD-8E25-6C9525410464}" type="datetimeFigureOut">
               <a:rPr lang="ko-KR" altLang="en-US" smtClean="0"/>
-              <a:t>2022. 11. 8.</a:t>
+              <a:t>2022-11-08</a:t>
             </a:fld>
             <a:endParaRPr lang="ko-KR" altLang="en-US"/>
           </a:p>
@@ -4353,65 +4355,6 @@
       </p:cxnSp>
       <p:sp>
         <p:nvSpPr>
-          <p:cNvPr id="17" name="TextBox 16">
-            <a:extLst>
-              <a:ext uri="{FF2B5EF4-FFF2-40B4-BE49-F238E27FC236}">
-                <a16:creationId xmlns:a16="http://schemas.microsoft.com/office/drawing/2014/main" id="{EF93F456-2C49-4A85-B01B-2D6BD46D6E98}"/>
-              </a:ext>
-            </a:extLst>
-          </p:cNvPr>
-          <p:cNvSpPr txBox="1"/>
-          <p:nvPr/>
-        </p:nvSpPr>
-        <p:spPr>
-          <a:xfrm>
-            <a:off x="276223" y="857337"/>
-            <a:ext cx="11339630" cy="523220"/>
-          </a:xfrm>
-          <a:prstGeom prst="rect">
-            <a:avLst/>
-          </a:prstGeom>
-          <a:noFill/>
-        </p:spPr>
-        <p:txBody>
-          <a:bodyPr wrap="square" rtlCol="0">
-            <a:spAutoFit/>
-          </a:bodyPr>
-          <a:lstStyle/>
-          <a:p>
-            <a:pPr algn="ctr"/>
-            <a:r>
-              <a:rPr lang="en-US" altLang="ko-KR" sz="2800" b="1" spc="100" dirty="0">
-                <a:solidFill>
-                  <a:srgbClr val="44546A"/>
-                </a:solidFill>
-                <a:latin typeface="나눔스퀘어 Bold" panose="020B0600000101010101" pitchFamily="50" charset="-127"/>
-                <a:ea typeface="나눔스퀘어 Bold" panose="020B0600000101010101" pitchFamily="50" charset="-127"/>
-              </a:rPr>
-              <a:t>14.1.2</a:t>
-            </a:r>
-            <a:r>
-              <a:rPr lang="ko-KR" altLang="en-US" sz="2800" b="1" spc="100" dirty="0">
-                <a:solidFill>
-                  <a:srgbClr val="44546A"/>
-                </a:solidFill>
-                <a:latin typeface="나눔스퀘어 Bold" panose="020B0600000101010101" pitchFamily="50" charset="-127"/>
-                <a:ea typeface="나눔스퀘어 Bold" panose="020B0600000101010101" pitchFamily="50" charset="-127"/>
-              </a:rPr>
-              <a:t> 전역 변수의 생명 주기</a:t>
-            </a:r>
-            <a:endParaRPr lang="en-US" altLang="ko-KR" sz="2800" b="1" spc="100" dirty="0">
-              <a:solidFill>
-                <a:srgbClr val="44546A"/>
-              </a:solidFill>
-              <a:latin typeface="나눔스퀘어 Bold" panose="020B0600000101010101" pitchFamily="50" charset="-127"/>
-              <a:ea typeface="나눔스퀘어 Bold" panose="020B0600000101010101" pitchFamily="50" charset="-127"/>
-            </a:endParaRPr>
-          </a:p>
-        </p:txBody>
-      </p:sp>
-      <p:sp>
-        <p:nvSpPr>
           <p:cNvPr id="2" name="TextBox 1">
             <a:extLst>
               <a:ext uri="{FF2B5EF4-FFF2-40B4-BE49-F238E27FC236}">
@@ -4661,8 +4604,8 @@
                 <a:solidFill>
                   <a:srgbClr val="44546A"/>
                 </a:solidFill>
-                <a:latin typeface="나눔스퀘어 Bold" panose="020B0600000101010101" pitchFamily="50" charset="-127"/>
-                <a:ea typeface="나눔스퀘어 Bold" panose="020B0600000101010101" pitchFamily="50" charset="-127"/>
+                <a:latin typeface="나눔스퀘어" panose="020B0600000101010101" pitchFamily="50" charset="-127"/>
+                <a:ea typeface="나눔스퀘어" panose="020B0600000101010101" pitchFamily="50" charset="-127"/>
               </a:rPr>
               <a:t>→ </a:t>
             </a:r>
@@ -4672,7 +4615,8 @@
                   <a:srgbClr val="57606A"/>
                 </a:solidFill>
                 <a:effectLst/>
-                <a:latin typeface="-apple-system"/>
+                <a:latin typeface="나눔스퀘어" panose="020B0600000101010101" pitchFamily="50" charset="-127"/>
+                <a:ea typeface="나눔스퀘어" panose="020B0600000101010101" pitchFamily="50" charset="-127"/>
               </a:rPr>
               <a:t>전역 객체는 코드가 실행되기 이전 단계에 자바스크립트 엔진에 의해 어떤 객체보다도 먼저 생성되는 특수한 객체다</a:t>
             </a:r>
@@ -4680,8 +4624,8 @@
               <a:solidFill>
                 <a:srgbClr val="57606A"/>
               </a:solidFill>
-              <a:latin typeface="-apple-system"/>
-              <a:ea typeface="나눔스퀘어 Bold" panose="020B0600000101010101" pitchFamily="50" charset="-127"/>
+              <a:latin typeface="나눔스퀘어" panose="020B0600000101010101" pitchFamily="50" charset="-127"/>
+              <a:ea typeface="나눔스퀘어" panose="020B0600000101010101" pitchFamily="50" charset="-127"/>
             </a:endParaRPr>
           </a:p>
           <a:p>
@@ -4690,8 +4634,8 @@
                 <a:solidFill>
                   <a:srgbClr val="44546A"/>
                 </a:solidFill>
-                <a:latin typeface="나눔스퀘어 Bold" panose="020B0600000101010101" pitchFamily="50" charset="-127"/>
-                <a:ea typeface="나눔스퀘어 Bold" panose="020B0600000101010101" pitchFamily="50" charset="-127"/>
+                <a:latin typeface="나눔스퀘어" panose="020B0600000101010101" pitchFamily="50" charset="-127"/>
+                <a:ea typeface="나눔스퀘어" panose="020B0600000101010101" pitchFamily="50" charset="-127"/>
               </a:rPr>
               <a:t>→ </a:t>
             </a:r>
@@ -4701,7 +4645,8 @@
                   <a:srgbClr val="57606A"/>
                 </a:solidFill>
                 <a:effectLst/>
-                <a:latin typeface="-apple-system"/>
+                <a:latin typeface="나눔스퀘어" panose="020B0600000101010101" pitchFamily="50" charset="-127"/>
+                <a:ea typeface="나눔스퀘어" panose="020B0600000101010101" pitchFamily="50" charset="-127"/>
               </a:rPr>
               <a:t>환경에 따라 전역 객체를 가리키는 다양한 </a:t>
             </a:r>
@@ -4711,7 +4656,8 @@
                   <a:srgbClr val="57606A"/>
                 </a:solidFill>
                 <a:effectLst/>
-                <a:latin typeface="-apple-system"/>
+                <a:latin typeface="나눔스퀘어" panose="020B0600000101010101" pitchFamily="50" charset="-127"/>
+                <a:ea typeface="나눔스퀘어" panose="020B0600000101010101" pitchFamily="50" charset="-127"/>
               </a:rPr>
               <a:t>식별자</a:t>
             </a:r>
@@ -4721,7 +4667,7 @@
                   <a:srgbClr val="57606A"/>
                 </a:solidFill>
                 <a:effectLst/>
-                <a:latin typeface="-apple-system"/>
+                <a:latin typeface="나눔스퀘어 Bold" panose="020B0600000101010101" pitchFamily="50" charset="-127"/>
               </a:rPr>
               <a:t>(</a:t>
             </a:r>
@@ -4735,7 +4681,7 @@
                   <a:srgbClr val="57606A"/>
                 </a:solidFill>
                 <a:effectLst/>
-                <a:latin typeface="-apple-system"/>
+                <a:latin typeface="나눔스퀘어 Bold" panose="020B0600000101010101" pitchFamily="50" charset="-127"/>
               </a:rPr>
               <a:t>, </a:t>
             </a:r>
@@ -4749,7 +4695,7 @@
                   <a:srgbClr val="57606A"/>
                 </a:solidFill>
                 <a:effectLst/>
-                <a:latin typeface="-apple-system"/>
+                <a:latin typeface="나눔스퀘어 Bold" panose="020B0600000101010101" pitchFamily="50" charset="-127"/>
               </a:rPr>
               <a:t>, </a:t>
             </a:r>
@@ -4763,7 +4709,7 @@
                   <a:srgbClr val="57606A"/>
                 </a:solidFill>
                 <a:effectLst/>
-                <a:latin typeface="-apple-system"/>
+                <a:latin typeface="나눔스퀘어 Bold" panose="020B0600000101010101" pitchFamily="50" charset="-127"/>
               </a:rPr>
               <a:t>, </a:t>
             </a:r>
@@ -4777,7 +4723,7 @@
                   <a:srgbClr val="57606A"/>
                 </a:solidFill>
                 <a:effectLst/>
-                <a:latin typeface="-apple-system"/>
+                <a:latin typeface="나눔스퀘어 Bold" panose="020B0600000101010101" pitchFamily="50" charset="-127"/>
               </a:rPr>
               <a:t>, </a:t>
             </a:r>
@@ -4791,7 +4737,7 @@
                   <a:srgbClr val="57606A"/>
                 </a:solidFill>
                 <a:effectLst/>
-                <a:latin typeface="-apple-system"/>
+                <a:latin typeface="나눔스퀘어 Bold" panose="020B0600000101010101" pitchFamily="50" charset="-127"/>
               </a:rPr>
               <a:t>)</a:t>
             </a:r>
@@ -4801,7 +4747,8 @@
                   <a:srgbClr val="57606A"/>
                 </a:solidFill>
                 <a:effectLst/>
-                <a:latin typeface="-apple-system"/>
+                <a:latin typeface="나눔스퀘어" panose="020B0600000101010101" pitchFamily="50" charset="-127"/>
+                <a:ea typeface="나눔스퀘어" panose="020B0600000101010101" pitchFamily="50" charset="-127"/>
               </a:rPr>
               <a:t>가 존재했으나 </a:t>
             </a:r>
@@ -4811,7 +4758,7 @@
                   <a:srgbClr val="57606A"/>
                 </a:solidFill>
                 <a:effectLst/>
-                <a:latin typeface="-apple-system"/>
+                <a:latin typeface="나눔스퀘어 Bold" panose="020B0600000101010101" pitchFamily="50" charset="-127"/>
               </a:rPr>
               <a:t>ES11(ECMAScript 11)</a:t>
             </a:r>
@@ -4821,21 +4768,35 @@
                   <a:srgbClr val="57606A"/>
                 </a:solidFill>
                 <a:effectLst/>
-                <a:latin typeface="-apple-system"/>
-              </a:rPr>
-              <a:t>에서 </a:t>
+                <a:latin typeface="나눔스퀘어" panose="020B0600000101010101" pitchFamily="50" charset="-127"/>
+                <a:ea typeface="나눔스퀘어" panose="020B0600000101010101" pitchFamily="50" charset="-127"/>
+              </a:rPr>
+              <a:t>에서</a:t>
+            </a:r>
+            <a:r>
+              <a:rPr lang="ko-KR" altLang="en-US" sz="1600" b="0" i="0" dirty="0">
+                <a:solidFill>
+                  <a:srgbClr val="57606A"/>
+                </a:solidFill>
+                <a:effectLst/>
+                <a:latin typeface="나눔스퀘어 Bold" panose="020B0600000101010101" pitchFamily="50" charset="-127"/>
+              </a:rPr>
+              <a:t> </a:t>
             </a:r>
             <a:endParaRPr lang="en-US" altLang="ko-KR" sz="1600" b="0" i="0" dirty="0">
               <a:solidFill>
                 <a:srgbClr val="57606A"/>
               </a:solidFill>
               <a:effectLst/>
-              <a:latin typeface="-apple-system"/>
+              <a:latin typeface="나눔스퀘어 Bold" panose="020B0600000101010101" pitchFamily="50" charset="-127"/>
             </a:endParaRPr>
           </a:p>
           <a:p>
             <a:r>
-              <a:rPr lang="en-US" sz="1600" dirty="0" err="1"/>
+              <a:rPr lang="en-US" sz="1600" dirty="0" err="1">
+                <a:latin typeface="나눔스퀘어 Bold" panose="020B0600000101010101" pitchFamily="50" charset="-127"/>
+                <a:ea typeface="나눔스퀘어 Bold" panose="020B0600000101010101" pitchFamily="50" charset="-127"/>
+              </a:rPr>
               <a:t>globalThis</a:t>
             </a:r>
             <a:r>
@@ -4844,7 +4805,8 @@
                   <a:srgbClr val="57606A"/>
                 </a:solidFill>
                 <a:effectLst/>
-                <a:latin typeface="-apple-system"/>
+                <a:latin typeface="나눔스퀘어" panose="020B0600000101010101" pitchFamily="50" charset="-127"/>
+                <a:ea typeface="나눔스퀘어" panose="020B0600000101010101" pitchFamily="50" charset="-127"/>
               </a:rPr>
               <a:t>로 통일되었다</a:t>
             </a:r>
@@ -4854,7 +4816,8 @@
                   <a:srgbClr val="57606A"/>
                 </a:solidFill>
                 <a:effectLst/>
-                <a:latin typeface="-apple-system"/>
+                <a:latin typeface="나눔스퀘어" panose="020B0600000101010101" pitchFamily="50" charset="-127"/>
+                <a:ea typeface="나눔스퀘어" panose="020B0600000101010101" pitchFamily="50" charset="-127"/>
               </a:rPr>
               <a:t>.</a:t>
             </a:r>
@@ -4862,8 +4825,8 @@
               <a:solidFill>
                 <a:srgbClr val="44546A"/>
               </a:solidFill>
-              <a:latin typeface="나눔스퀘어 Bold" panose="020B0600000101010101" pitchFamily="50" charset="-127"/>
-              <a:ea typeface="나눔스퀘어 Bold" panose="020B0600000101010101" pitchFamily="50" charset="-127"/>
+              <a:latin typeface="나눔스퀘어" panose="020B0600000101010101" pitchFamily="50" charset="-127"/>
+              <a:ea typeface="나눔스퀘어" panose="020B0600000101010101" pitchFamily="50" charset="-127"/>
             </a:endParaRPr>
           </a:p>
         </p:txBody>
@@ -5037,6 +5000,64 @@
           </a:prstGeom>
         </p:spPr>
       </p:pic>
+      <p:sp>
+        <p:nvSpPr>
+          <p:cNvPr id="4" name="TextBox 3">
+            <a:extLst>
+              <a:ext uri="{FF2B5EF4-FFF2-40B4-BE49-F238E27FC236}">
+                <a16:creationId xmlns:a16="http://schemas.microsoft.com/office/drawing/2014/main" id="{49DDEA6C-B0F3-E61C-EADA-A1EFD5874F4F}"/>
+              </a:ext>
+            </a:extLst>
+          </p:cNvPr>
+          <p:cNvSpPr txBox="1"/>
+          <p:nvPr/>
+        </p:nvSpPr>
+        <p:spPr>
+          <a:xfrm>
+            <a:off x="276223" y="857337"/>
+            <a:ext cx="11339630" cy="523220"/>
+          </a:xfrm>
+          <a:prstGeom prst="rect">
+            <a:avLst/>
+          </a:prstGeom>
+          <a:noFill/>
+        </p:spPr>
+        <p:txBody>
+          <a:bodyPr wrap="square" rtlCol="0">
+            <a:spAutoFit/>
+          </a:bodyPr>
+          <a:lstStyle/>
+          <a:p>
+            <a:r>
+              <a:rPr lang="en-US" altLang="ko-KR" sz="2800" b="1" spc="100" dirty="0">
+                <a:solidFill>
+                  <a:srgbClr val="44546A"/>
+                </a:solidFill>
+                <a:latin typeface="나눔스퀘어 Bold" panose="020B0600000101010101" pitchFamily="50" charset="-127"/>
+                <a:ea typeface="나눔스퀘어 Bold" panose="020B0600000101010101" pitchFamily="50" charset="-127"/>
+              </a:rPr>
+              <a:t> -</a:t>
+            </a:r>
+            <a:r>
+              <a:rPr lang="ko-KR" altLang="en-US" sz="2800" b="1" spc="100" dirty="0">
+                <a:solidFill>
+                  <a:srgbClr val="44546A"/>
+                </a:solidFill>
+                <a:latin typeface="나눔스퀘어 Bold" panose="020B0600000101010101" pitchFamily="50" charset="-127"/>
+                <a:ea typeface="나눔스퀘어 Bold" panose="020B0600000101010101" pitchFamily="50" charset="-127"/>
+              </a:rPr>
+              <a:t> 전역 변수의 생명 주기</a:t>
+            </a:r>
+            <a:endParaRPr lang="en-US" altLang="ko-KR" sz="2800" b="1" spc="100" dirty="0">
+              <a:solidFill>
+                <a:srgbClr val="44546A"/>
+              </a:solidFill>
+              <a:latin typeface="나눔스퀘어 Bold" panose="020B0600000101010101" pitchFamily="50" charset="-127"/>
+              <a:ea typeface="나눔스퀘어 Bold" panose="020B0600000101010101" pitchFamily="50" charset="-127"/>
+            </a:endParaRPr>
+          </a:p>
+        </p:txBody>
+      </p:sp>
     </p:spTree>
     <p:extLst>
       <p:ext uri="{BB962C8B-B14F-4D97-AF65-F5344CB8AC3E}">
@@ -5047,13 +5068,13 @@
   <p:clrMapOvr>
     <a:masterClrMapping/>
   </p:clrMapOvr>
-  <mc:AlternateContent xmlns:mc="http://schemas.openxmlformats.org/markup-compatibility/2006">
-    <mc:Choice xmlns:p159="http://schemas.microsoft.com/office/powerpoint/2015/09/main" Requires="p159">
+  <mc:AlternateContent xmlns:mc="http://schemas.openxmlformats.org/markup-compatibility/2006" xmlns:p159="http://schemas.microsoft.com/office/powerpoint/2015/09/main">
+    <mc:Choice Requires="p159">
       <p:transition xmlns:p14="http://schemas.microsoft.com/office/powerpoint/2010/main" spd="slow" p14:dur="2000">
         <p159:morph option="byObject"/>
       </p:transition>
     </mc:Choice>
-    <mc:Fallback>
+    <mc:Fallback xmlns="">
       <p:transition spd="slow">
         <p:fade/>
       </p:transition>
@@ -5256,65 +5277,6 @@
       </p:cxnSp>
       <p:sp>
         <p:nvSpPr>
-          <p:cNvPr id="17" name="TextBox 16">
-            <a:extLst>
-              <a:ext uri="{FF2B5EF4-FFF2-40B4-BE49-F238E27FC236}">
-                <a16:creationId xmlns:a16="http://schemas.microsoft.com/office/drawing/2014/main" id="{EF93F456-2C49-4A85-B01B-2D6BD46D6E98}"/>
-              </a:ext>
-            </a:extLst>
-          </p:cNvPr>
-          <p:cNvSpPr txBox="1"/>
-          <p:nvPr/>
-        </p:nvSpPr>
-        <p:spPr>
-          <a:xfrm>
-            <a:off x="276223" y="857337"/>
-            <a:ext cx="11339630" cy="523220"/>
-          </a:xfrm>
-          <a:prstGeom prst="rect">
-            <a:avLst/>
-          </a:prstGeom>
-          <a:noFill/>
-        </p:spPr>
-        <p:txBody>
-          <a:bodyPr wrap="square" rtlCol="0">
-            <a:spAutoFit/>
-          </a:bodyPr>
-          <a:lstStyle/>
-          <a:p>
-            <a:pPr algn="ctr"/>
-            <a:r>
-              <a:rPr lang="en-US" altLang="ko-KR" sz="2800" b="1" spc="100" dirty="0">
-                <a:solidFill>
-                  <a:srgbClr val="44546A"/>
-                </a:solidFill>
-                <a:latin typeface="나눔스퀘어 Bold" panose="020B0600000101010101" pitchFamily="50" charset="-127"/>
-                <a:ea typeface="나눔스퀘어 Bold" panose="020B0600000101010101" pitchFamily="50" charset="-127"/>
-              </a:rPr>
-              <a:t>14.1.2</a:t>
-            </a:r>
-            <a:r>
-              <a:rPr lang="ko-KR" altLang="en-US" sz="2800" b="1" spc="100" dirty="0">
-                <a:solidFill>
-                  <a:srgbClr val="44546A"/>
-                </a:solidFill>
-                <a:latin typeface="나눔스퀘어 Bold" panose="020B0600000101010101" pitchFamily="50" charset="-127"/>
-                <a:ea typeface="나눔스퀘어 Bold" panose="020B0600000101010101" pitchFamily="50" charset="-127"/>
-              </a:rPr>
-              <a:t> 전역 변수의 생명 주기</a:t>
-            </a:r>
-            <a:endParaRPr lang="en-US" altLang="ko-KR" sz="2800" b="1" spc="100" dirty="0">
-              <a:solidFill>
-                <a:srgbClr val="44546A"/>
-              </a:solidFill>
-              <a:latin typeface="나눔스퀘어 Bold" panose="020B0600000101010101" pitchFamily="50" charset="-127"/>
-              <a:ea typeface="나눔스퀘어 Bold" panose="020B0600000101010101" pitchFamily="50" charset="-127"/>
-            </a:endParaRPr>
-          </a:p>
-        </p:txBody>
-      </p:sp>
-      <p:sp>
-        <p:nvSpPr>
           <p:cNvPr id="2" name="TextBox 1">
             <a:extLst>
               <a:ext uri="{FF2B5EF4-FFF2-40B4-BE49-F238E27FC236}">
@@ -5546,7 +5508,7 @@
         <p:spPr>
           <a:xfrm>
             <a:off x="4069140" y="2977448"/>
-            <a:ext cx="7546713" cy="1477328"/>
+            <a:ext cx="7546713" cy="1754326"/>
           </a:xfrm>
           <a:prstGeom prst="rect">
             <a:avLst/>
@@ -5564,7 +5526,7 @@
                 <a:solidFill>
                   <a:srgbClr val="57606A"/>
                 </a:solidFill>
-                <a:latin typeface="-apple-system"/>
+                <a:latin typeface="나눔스퀘어 Bold" panose="020B0600000101010101" pitchFamily="50" charset="-127"/>
                 <a:ea typeface="나눔스퀘어 Bold" panose="020B0600000101010101" pitchFamily="50" charset="-127"/>
               </a:rPr>
               <a:t>브라우저 환경에서 전역 객체는 </a:t>
@@ -5577,7 +5539,7 @@
                 <a:highlight>
                   <a:srgbClr val="FFFF00"/>
                 </a:highlight>
-                <a:latin typeface="-apple-system"/>
+                <a:latin typeface="나눔스퀘어 Bold" panose="020B0600000101010101" pitchFamily="50" charset="-127"/>
                 <a:ea typeface="나눔스퀘어 Bold" panose="020B0600000101010101" pitchFamily="50" charset="-127"/>
               </a:rPr>
               <a:t>window</a:t>
@@ -5587,7 +5549,7 @@
                 <a:solidFill>
                   <a:srgbClr val="57606A"/>
                 </a:solidFill>
-                <a:latin typeface="-apple-system"/>
+                <a:latin typeface="나눔스퀘어 Bold" panose="020B0600000101010101" pitchFamily="50" charset="-127"/>
                 <a:ea typeface="나눔스퀘어 Bold" panose="020B0600000101010101" pitchFamily="50" charset="-127"/>
               </a:rPr>
               <a:t>이므로 </a:t>
@@ -5596,7 +5558,7 @@
               <a:solidFill>
                 <a:srgbClr val="57606A"/>
               </a:solidFill>
-              <a:latin typeface="-apple-system"/>
+              <a:latin typeface="나눔스퀘어 Bold" panose="020B0600000101010101" pitchFamily="50" charset="-127"/>
               <a:ea typeface="나눔스퀘어 Bold" panose="020B0600000101010101" pitchFamily="50" charset="-127"/>
             </a:endParaRPr>
           </a:p>
@@ -5610,7 +5572,7 @@
                 <a:solidFill>
                   <a:srgbClr val="FF0000"/>
                 </a:solidFill>
-                <a:latin typeface="-apple-system"/>
+                <a:latin typeface="나눔스퀘어 Bold" panose="020B0600000101010101" pitchFamily="50" charset="-127"/>
                 <a:ea typeface="나눔스퀘어 Bold" panose="020B0600000101010101" pitchFamily="50" charset="-127"/>
               </a:rPr>
               <a:t>var</a:t>
@@ -5620,7 +5582,7 @@
                 <a:solidFill>
                   <a:srgbClr val="57606A"/>
                 </a:solidFill>
-                <a:latin typeface="-apple-system"/>
+                <a:latin typeface="나눔스퀘어 Bold" panose="020B0600000101010101" pitchFamily="50" charset="-127"/>
                 <a:ea typeface="나눔스퀘어 Bold" panose="020B0600000101010101" pitchFamily="50" charset="-127"/>
               </a:rPr>
               <a:t> </a:t>
@@ -5630,7 +5592,7 @@
                 <a:solidFill>
                   <a:srgbClr val="57606A"/>
                 </a:solidFill>
-                <a:latin typeface="-apple-system"/>
+                <a:latin typeface="나눔스퀘어 Bold" panose="020B0600000101010101" pitchFamily="50" charset="-127"/>
                 <a:ea typeface="나눔스퀘어 Bold" panose="020B0600000101010101" pitchFamily="50" charset="-127"/>
               </a:rPr>
               <a:t>키워드로 선언한 전역 변수는 </a:t>
@@ -5643,7 +5605,7 @@
                 <a:highlight>
                   <a:srgbClr val="FFFF00"/>
                 </a:highlight>
-                <a:latin typeface="-apple-system"/>
+                <a:latin typeface="나눔스퀘어 Bold" panose="020B0600000101010101" pitchFamily="50" charset="-127"/>
                 <a:ea typeface="나눔스퀘어 Bold" panose="020B0600000101010101" pitchFamily="50" charset="-127"/>
               </a:rPr>
               <a:t>웹페이지</a:t>
@@ -5653,7 +5615,7 @@
                 <a:solidFill>
                   <a:srgbClr val="57606A"/>
                 </a:solidFill>
-                <a:latin typeface="-apple-system"/>
+                <a:latin typeface="나눔스퀘어 Bold" panose="020B0600000101010101" pitchFamily="50" charset="-127"/>
                 <a:ea typeface="나눔스퀘어 Bold" panose="020B0600000101010101" pitchFamily="50" charset="-127"/>
               </a:rPr>
               <a:t>를</a:t>
@@ -5663,7 +5625,7 @@
                 <a:solidFill>
                   <a:srgbClr val="57606A"/>
                 </a:solidFill>
-                <a:latin typeface="-apple-system"/>
+                <a:latin typeface="나눔스퀘어 Bold" panose="020B0600000101010101" pitchFamily="50" charset="-127"/>
                 <a:ea typeface="나눔스퀘어 Bold" panose="020B0600000101010101" pitchFamily="50" charset="-127"/>
               </a:rPr>
               <a:t> 닫을 때까지 유효하다</a:t>
@@ -5673,7 +5635,7 @@
                 <a:solidFill>
                   <a:srgbClr val="57606A"/>
                 </a:solidFill>
-                <a:latin typeface="-apple-system"/>
+                <a:latin typeface="나눔스퀘어 Bold" panose="020B0600000101010101" pitchFamily="50" charset="-127"/>
                 <a:ea typeface="나눔스퀘어 Bold" panose="020B0600000101010101" pitchFamily="50" charset="-127"/>
               </a:rPr>
               <a:t>.</a:t>
@@ -5688,7 +5650,7 @@
               <a:solidFill>
                 <a:srgbClr val="57606A"/>
               </a:solidFill>
-              <a:latin typeface="-apple-system"/>
+              <a:latin typeface="나눔스퀘어 Bold" panose="020B0600000101010101" pitchFamily="50" charset="-127"/>
               <a:ea typeface="나눔스퀘어 Bold" panose="020B0600000101010101" pitchFamily="50" charset="-127"/>
             </a:endParaRPr>
           </a:p>
@@ -5702,7 +5664,7 @@
                 <a:solidFill>
                   <a:srgbClr val="FF0000"/>
                 </a:solidFill>
-                <a:latin typeface="-apple-system"/>
+                <a:latin typeface="나눔스퀘어 Bold" panose="020B0600000101010101" pitchFamily="50" charset="-127"/>
                 <a:ea typeface="나눔스퀘어 Bold" panose="020B0600000101010101" pitchFamily="50" charset="-127"/>
               </a:rPr>
               <a:t>var</a:t>
@@ -5712,7 +5674,7 @@
                 <a:solidFill>
                   <a:srgbClr val="57606A"/>
                 </a:solidFill>
-                <a:latin typeface="-apple-system"/>
+                <a:latin typeface="나눔스퀘어 Bold" panose="020B0600000101010101" pitchFamily="50" charset="-127"/>
                 <a:ea typeface="나눔스퀘어 Bold" panose="020B0600000101010101" pitchFamily="50" charset="-127"/>
               </a:rPr>
               <a:t> </a:t>
@@ -5722,7 +5684,7 @@
                 <a:solidFill>
                   <a:srgbClr val="57606A"/>
                 </a:solidFill>
-                <a:latin typeface="-apple-system"/>
+                <a:latin typeface="나눔스퀘어 Bold" panose="020B0600000101010101" pitchFamily="50" charset="-127"/>
                 <a:ea typeface="나눔스퀘어 Bold" panose="020B0600000101010101" pitchFamily="50" charset="-127"/>
               </a:rPr>
               <a:t>키워드로 선언한 전역 변수의 생명 주기는 전역 객체의 생명 주기와 일치한다</a:t>
@@ -5732,7 +5694,7 @@
                 <a:solidFill>
                   <a:srgbClr val="57606A"/>
                 </a:solidFill>
-                <a:latin typeface="-apple-system"/>
+                <a:latin typeface="나눔스퀘어 Bold" panose="020B0600000101010101" pitchFamily="50" charset="-127"/>
                 <a:ea typeface="나눔스퀘어 Bold" panose="020B0600000101010101" pitchFamily="50" charset="-127"/>
               </a:rPr>
               <a:t>.</a:t>
@@ -5824,6 +5786,64 @@
           </a:prstGeom>
         </p:spPr>
       </p:pic>
+      <p:sp>
+        <p:nvSpPr>
+          <p:cNvPr id="4" name="TextBox 3">
+            <a:extLst>
+              <a:ext uri="{FF2B5EF4-FFF2-40B4-BE49-F238E27FC236}">
+                <a16:creationId xmlns:a16="http://schemas.microsoft.com/office/drawing/2014/main" id="{176EDE57-A111-FF37-0402-FAD71B5F1ACB}"/>
+              </a:ext>
+            </a:extLst>
+          </p:cNvPr>
+          <p:cNvSpPr txBox="1"/>
+          <p:nvPr/>
+        </p:nvSpPr>
+        <p:spPr>
+          <a:xfrm>
+            <a:off x="276223" y="857337"/>
+            <a:ext cx="11339630" cy="523220"/>
+          </a:xfrm>
+          <a:prstGeom prst="rect">
+            <a:avLst/>
+          </a:prstGeom>
+          <a:noFill/>
+        </p:spPr>
+        <p:txBody>
+          <a:bodyPr wrap="square" rtlCol="0">
+            <a:spAutoFit/>
+          </a:bodyPr>
+          <a:lstStyle/>
+          <a:p>
+            <a:r>
+              <a:rPr lang="en-US" altLang="ko-KR" sz="2800" b="1" spc="100" dirty="0">
+                <a:solidFill>
+                  <a:srgbClr val="44546A"/>
+                </a:solidFill>
+                <a:latin typeface="나눔스퀘어 Bold" panose="020B0600000101010101" pitchFamily="50" charset="-127"/>
+                <a:ea typeface="나눔스퀘어 Bold" panose="020B0600000101010101" pitchFamily="50" charset="-127"/>
+              </a:rPr>
+              <a:t> -</a:t>
+            </a:r>
+            <a:r>
+              <a:rPr lang="ko-KR" altLang="en-US" sz="2800" b="1" spc="100" dirty="0">
+                <a:solidFill>
+                  <a:srgbClr val="44546A"/>
+                </a:solidFill>
+                <a:latin typeface="나눔스퀘어 Bold" panose="020B0600000101010101" pitchFamily="50" charset="-127"/>
+                <a:ea typeface="나눔스퀘어 Bold" panose="020B0600000101010101" pitchFamily="50" charset="-127"/>
+              </a:rPr>
+              <a:t> 전역 변수의 생명 주기</a:t>
+            </a:r>
+            <a:endParaRPr lang="en-US" altLang="ko-KR" sz="2800" b="1" spc="100" dirty="0">
+              <a:solidFill>
+                <a:srgbClr val="44546A"/>
+              </a:solidFill>
+              <a:latin typeface="나눔스퀘어 Bold" panose="020B0600000101010101" pitchFamily="50" charset="-127"/>
+              <a:ea typeface="나눔스퀘어 Bold" panose="020B0600000101010101" pitchFamily="50" charset="-127"/>
+            </a:endParaRPr>
+          </a:p>
+        </p:txBody>
+      </p:sp>
     </p:spTree>
     <p:extLst>
       <p:ext uri="{BB962C8B-B14F-4D97-AF65-F5344CB8AC3E}">
@@ -5834,13 +5854,13 @@
   <p:clrMapOvr>
     <a:masterClrMapping/>
   </p:clrMapOvr>
-  <mc:AlternateContent xmlns:mc="http://schemas.openxmlformats.org/markup-compatibility/2006">
-    <mc:Choice xmlns:p159="http://schemas.microsoft.com/office/powerpoint/2015/09/main" Requires="p159">
+  <mc:AlternateContent xmlns:mc="http://schemas.openxmlformats.org/markup-compatibility/2006" xmlns:p159="http://schemas.microsoft.com/office/powerpoint/2015/09/main">
+    <mc:Choice Requires="p159">
       <p:transition xmlns:p14="http://schemas.microsoft.com/office/powerpoint/2010/main" spd="slow" p14:dur="2000">
         <p159:morph option="byObject"/>
       </p:transition>
     </mc:Choice>
-    <mc:Fallback>
+    <mc:Fallback xmlns="">
       <p:transition spd="slow">
         <p:fade/>
       </p:transition>
@@ -5850,1168 +5870,6 @@
 </file>
 
 <file path=ppt/slides/slide12.xml><?xml version="1.0" encoding="utf-8"?>
-<p:sld xmlns:a="http://schemas.openxmlformats.org/drawingml/2006/main" xmlns:r="http://schemas.openxmlformats.org/officeDocument/2006/relationships" xmlns:p="http://schemas.openxmlformats.org/presentationml/2006/main">
-  <p:cSld>
-    <p:spTree>
-      <p:nvGrpSpPr>
-        <p:cNvPr id="1" name=""/>
-        <p:cNvGrpSpPr/>
-        <p:nvPr/>
-      </p:nvGrpSpPr>
-      <p:grpSpPr>
-        <a:xfrm>
-          <a:off x="0" y="0"/>
-          <a:ext cx="0" cy="0"/>
-          <a:chOff x="0" y="0"/>
-          <a:chExt cx="0" cy="0"/>
-        </a:xfrm>
-      </p:grpSpPr>
-      <p:cxnSp>
-        <p:nvCxnSpPr>
-          <p:cNvPr id="3" name="직선 연결선 2">
-            <a:extLst>
-              <a:ext uri="{FF2B5EF4-FFF2-40B4-BE49-F238E27FC236}">
-                <a16:creationId xmlns:a16="http://schemas.microsoft.com/office/drawing/2014/main" id="{F55676F0-C433-4456-BB57-3E5832581EF6}"/>
-              </a:ext>
-            </a:extLst>
-          </p:cNvPr>
-          <p:cNvCxnSpPr>
-            <a:cxnSpLocks/>
-          </p:cNvCxnSpPr>
-          <p:nvPr/>
-        </p:nvCxnSpPr>
-        <p:spPr>
-          <a:xfrm>
-            <a:off x="10337785" y="696814"/>
-            <a:ext cx="1577992" cy="0"/>
-          </a:xfrm>
-          <a:prstGeom prst="line">
-            <a:avLst/>
-          </a:prstGeom>
-          <a:ln w="34925">
-            <a:solidFill>
-              <a:schemeClr val="tx2"/>
-            </a:solidFill>
-          </a:ln>
-        </p:spPr>
-        <p:style>
-          <a:lnRef idx="1">
-            <a:schemeClr val="accent1"/>
-          </a:lnRef>
-          <a:fillRef idx="0">
-            <a:schemeClr val="accent1"/>
-          </a:fillRef>
-          <a:effectRef idx="0">
-            <a:schemeClr val="accent1"/>
-          </a:effectRef>
-          <a:fontRef idx="minor">
-            <a:schemeClr val="tx1"/>
-          </a:fontRef>
-        </p:style>
-      </p:cxnSp>
-      <p:sp>
-        <p:nvSpPr>
-          <p:cNvPr id="6" name="TextBox 5">
-            <a:extLst>
-              <a:ext uri="{FF2B5EF4-FFF2-40B4-BE49-F238E27FC236}">
-                <a16:creationId xmlns:a16="http://schemas.microsoft.com/office/drawing/2014/main" id="{C7B00371-8BBF-468F-BAB5-3B58CE59B669}"/>
-              </a:ext>
-            </a:extLst>
-          </p:cNvPr>
-          <p:cNvSpPr txBox="1"/>
-          <p:nvPr/>
-        </p:nvSpPr>
-        <p:spPr>
-          <a:xfrm>
-            <a:off x="10337785" y="310773"/>
-            <a:ext cx="1577991" cy="400110"/>
-          </a:xfrm>
-          <a:prstGeom prst="rect">
-            <a:avLst/>
-          </a:prstGeom>
-          <a:noFill/>
-        </p:spPr>
-        <p:txBody>
-          <a:bodyPr wrap="square" rtlCol="0">
-            <a:spAutoFit/>
-          </a:bodyPr>
-          <a:lstStyle/>
-          <a:p>
-            <a:pPr algn="ctr"/>
-            <a:r>
-              <a:rPr lang="ko-KR" altLang="en-US" sz="2000" dirty="0" err="1">
-                <a:solidFill>
-                  <a:schemeClr val="tx2">
-                    <a:lumMod val="50000"/>
-                  </a:schemeClr>
-                </a:solidFill>
-                <a:latin typeface="나눔스퀘어 ExtraBold" panose="020B0600000101010101" pitchFamily="50" charset="-127"/>
-                <a:ea typeface="나눔스퀘어 ExtraBold" panose="020B0600000101010101" pitchFamily="50" charset="-127"/>
-              </a:rPr>
-              <a:t>컴공특</a:t>
-            </a:r>
-            <a:r>
-              <a:rPr lang="ko-KR" altLang="en-US" sz="2000" dirty="0">
-                <a:solidFill>
-                  <a:schemeClr val="tx2">
-                    <a:lumMod val="50000"/>
-                  </a:schemeClr>
-                </a:solidFill>
-                <a:latin typeface="나눔스퀘어 ExtraBold" panose="020B0600000101010101" pitchFamily="50" charset="-127"/>
-                <a:ea typeface="나눔스퀘어 ExtraBold" panose="020B0600000101010101" pitchFamily="50" charset="-127"/>
-              </a:rPr>
-              <a:t> </a:t>
-            </a:r>
-            <a:r>
-              <a:rPr lang="en-US" altLang="ko-KR" sz="2000" dirty="0">
-                <a:solidFill>
-                  <a:schemeClr val="tx2">
-                    <a:lumMod val="50000"/>
-                  </a:schemeClr>
-                </a:solidFill>
-                <a:latin typeface="나눔스퀘어 ExtraBold" panose="020B0600000101010101" pitchFamily="50" charset="-127"/>
-                <a:ea typeface="나눔스퀘어 ExtraBold" panose="020B0600000101010101" pitchFamily="50" charset="-127"/>
-              </a:rPr>
-              <a:t>3</a:t>
-            </a:r>
-            <a:r>
-              <a:rPr lang="ko-KR" altLang="en-US" sz="2000" dirty="0">
-                <a:solidFill>
-                  <a:schemeClr val="tx2">
-                    <a:lumMod val="50000"/>
-                  </a:schemeClr>
-                </a:solidFill>
-                <a:latin typeface="나눔스퀘어 ExtraBold" panose="020B0600000101010101" pitchFamily="50" charset="-127"/>
-                <a:ea typeface="나눔스퀘어 ExtraBold" panose="020B0600000101010101" pitchFamily="50" charset="-127"/>
-              </a:rPr>
-              <a:t>팀</a:t>
-            </a:r>
-            <a:endParaRPr lang="en-US" altLang="ko-KR" sz="2000" dirty="0">
-              <a:solidFill>
-                <a:schemeClr val="tx2">
-                  <a:lumMod val="50000"/>
-                </a:schemeClr>
-              </a:solidFill>
-              <a:latin typeface="나눔스퀘어 ExtraBold" panose="020B0600000101010101" pitchFamily="50" charset="-127"/>
-              <a:ea typeface="나눔스퀘어 ExtraBold" panose="020B0600000101010101" pitchFamily="50" charset="-127"/>
-            </a:endParaRPr>
-          </a:p>
-        </p:txBody>
-      </p:sp>
-      <p:cxnSp>
-        <p:nvCxnSpPr>
-          <p:cNvPr id="9" name="직선 연결선 8">
-            <a:extLst>
-              <a:ext uri="{FF2B5EF4-FFF2-40B4-BE49-F238E27FC236}">
-                <a16:creationId xmlns:a16="http://schemas.microsoft.com/office/drawing/2014/main" id="{5140239F-7841-40D4-B023-7486FD09274D}"/>
-              </a:ext>
-            </a:extLst>
-          </p:cNvPr>
-          <p:cNvCxnSpPr>
-            <a:cxnSpLocks/>
-          </p:cNvCxnSpPr>
-          <p:nvPr/>
-        </p:nvCxnSpPr>
-        <p:spPr>
-          <a:xfrm>
-            <a:off x="10337785" y="267285"/>
-            <a:ext cx="1577992" cy="0"/>
-          </a:xfrm>
-          <a:prstGeom prst="line">
-            <a:avLst/>
-          </a:prstGeom>
-          <a:ln w="34925">
-            <a:solidFill>
-              <a:schemeClr val="tx2"/>
-            </a:solidFill>
-          </a:ln>
-        </p:spPr>
-        <p:style>
-          <a:lnRef idx="1">
-            <a:schemeClr val="accent1"/>
-          </a:lnRef>
-          <a:fillRef idx="0">
-            <a:schemeClr val="accent1"/>
-          </a:fillRef>
-          <a:effectRef idx="0">
-            <a:schemeClr val="accent1"/>
-          </a:effectRef>
-          <a:fontRef idx="minor">
-            <a:schemeClr val="tx1"/>
-          </a:fontRef>
-        </p:style>
-      </p:cxnSp>
-      <p:sp>
-        <p:nvSpPr>
-          <p:cNvPr id="17" name="TextBox 16">
-            <a:extLst>
-              <a:ext uri="{FF2B5EF4-FFF2-40B4-BE49-F238E27FC236}">
-                <a16:creationId xmlns:a16="http://schemas.microsoft.com/office/drawing/2014/main" id="{EF93F456-2C49-4A85-B01B-2D6BD46D6E98}"/>
-              </a:ext>
-            </a:extLst>
-          </p:cNvPr>
-          <p:cNvSpPr txBox="1"/>
-          <p:nvPr/>
-        </p:nvSpPr>
-        <p:spPr>
-          <a:xfrm>
-            <a:off x="762855" y="1295512"/>
-            <a:ext cx="10680876" cy="461665"/>
-          </a:xfrm>
-          <a:prstGeom prst="rect">
-            <a:avLst/>
-          </a:prstGeom>
-          <a:noFill/>
-        </p:spPr>
-        <p:txBody>
-          <a:bodyPr wrap="square" rtlCol="0">
-            <a:spAutoFit/>
-          </a:bodyPr>
-          <a:lstStyle/>
-          <a:p>
-            <a:r>
-              <a:rPr lang="ko-KR" altLang="en-US" sz="2400" spc="100" dirty="0">
-                <a:solidFill>
-                  <a:srgbClr val="44546A"/>
-                </a:solidFill>
-                <a:latin typeface="나눔스퀘어 Bold" panose="020B0600000101010101" pitchFamily="50" charset="-127"/>
-                <a:ea typeface="나눔스퀘어 Bold" panose="020B0600000101010101" pitchFamily="50" charset="-127"/>
-              </a:rPr>
-              <a:t>전역 변수를 반드시 사용해야 할 이유를 찾지 못한다면</a:t>
-            </a:r>
-            <a:endParaRPr lang="en-US" altLang="ko-KR" sz="2400" spc="100" dirty="0">
-              <a:solidFill>
-                <a:srgbClr val="44546A"/>
-              </a:solidFill>
-              <a:latin typeface="나눔스퀘어 Bold" panose="020B0600000101010101" pitchFamily="50" charset="-127"/>
-              <a:ea typeface="나눔스퀘어 Bold" panose="020B0600000101010101" pitchFamily="50" charset="-127"/>
-            </a:endParaRPr>
-          </a:p>
-        </p:txBody>
-      </p:sp>
-      <p:sp>
-        <p:nvSpPr>
-          <p:cNvPr id="2" name="TextBox 1">
-            <a:extLst>
-              <a:ext uri="{FF2B5EF4-FFF2-40B4-BE49-F238E27FC236}">
-                <a16:creationId xmlns:a16="http://schemas.microsoft.com/office/drawing/2014/main" id="{2EB84E09-966C-F46D-B211-890C52264C2E}"/>
-              </a:ext>
-            </a:extLst>
-          </p:cNvPr>
-          <p:cNvSpPr txBox="1"/>
-          <p:nvPr/>
-        </p:nvSpPr>
-        <p:spPr>
-          <a:xfrm>
-            <a:off x="8802448" y="267286"/>
-            <a:ext cx="1183644" cy="461665"/>
-          </a:xfrm>
-          <a:prstGeom prst="rect">
-            <a:avLst/>
-          </a:prstGeom>
-          <a:noFill/>
-        </p:spPr>
-        <p:txBody>
-          <a:bodyPr wrap="square" rtlCol="0">
-            <a:spAutoFit/>
-          </a:bodyPr>
-          <a:lstStyle/>
-          <a:p>
-            <a:r>
-              <a:rPr lang="en-US" altLang="ko-KR" sz="2400" spc="100" dirty="0">
-                <a:solidFill>
-                  <a:srgbClr val="000000"/>
-                </a:solidFill>
-                <a:latin typeface="나눔스퀘어 Bold" panose="020B0600000101010101" pitchFamily="50" charset="-127"/>
-                <a:ea typeface="나눔스퀘어 Bold" panose="020B0600000101010101" pitchFamily="50" charset="-127"/>
-              </a:rPr>
-              <a:t>p.</a:t>
-            </a:r>
-            <a:r>
-              <a:rPr lang="ko-KR" altLang="en-US" sz="2400" spc="100" dirty="0">
-                <a:solidFill>
-                  <a:srgbClr val="000000"/>
-                </a:solidFill>
-                <a:latin typeface="나눔스퀘어 Bold" panose="020B0600000101010101" pitchFamily="50" charset="-127"/>
-                <a:ea typeface="나눔스퀘어 Bold" panose="020B0600000101010101" pitchFamily="50" charset="-127"/>
-              </a:rPr>
-              <a:t> </a:t>
-            </a:r>
-            <a:r>
-              <a:rPr lang="en-US" altLang="ko-KR" sz="2400" spc="100" dirty="0">
-                <a:solidFill>
-                  <a:srgbClr val="000000"/>
-                </a:solidFill>
-                <a:latin typeface="나눔스퀘어 Bold" panose="020B0600000101010101" pitchFamily="50" charset="-127"/>
-                <a:ea typeface="나눔스퀘어 Bold" panose="020B0600000101010101" pitchFamily="50" charset="-127"/>
-              </a:rPr>
-              <a:t>204</a:t>
-            </a:r>
-            <a:endParaRPr lang="ko-KR" altLang="en-US" sz="2400" spc="100" dirty="0">
-              <a:solidFill>
-                <a:srgbClr val="000000"/>
-              </a:solidFill>
-              <a:latin typeface="나눔스퀘어 Bold" panose="020B0600000101010101" pitchFamily="50" charset="-127"/>
-              <a:ea typeface="나눔스퀘어 Bold" panose="020B0600000101010101" pitchFamily="50" charset="-127"/>
-            </a:endParaRPr>
-          </a:p>
-        </p:txBody>
-      </p:sp>
-      <p:sp>
-        <p:nvSpPr>
-          <p:cNvPr id="4" name="TextBox 3">
-            <a:extLst>
-              <a:ext uri="{FF2B5EF4-FFF2-40B4-BE49-F238E27FC236}">
-                <a16:creationId xmlns:a16="http://schemas.microsoft.com/office/drawing/2014/main" id="{DC8BBE5B-E8D7-C054-A95F-7CFAC419A57B}"/>
-              </a:ext>
-            </a:extLst>
-          </p:cNvPr>
-          <p:cNvSpPr txBox="1"/>
-          <p:nvPr/>
-        </p:nvSpPr>
-        <p:spPr>
-          <a:xfrm>
-            <a:off x="762855" y="2601279"/>
-            <a:ext cx="10680876" cy="461665"/>
-          </a:xfrm>
-          <a:prstGeom prst="rect">
-            <a:avLst/>
-          </a:prstGeom>
-          <a:noFill/>
-        </p:spPr>
-        <p:txBody>
-          <a:bodyPr wrap="square" rtlCol="0">
-            <a:spAutoFit/>
-          </a:bodyPr>
-          <a:lstStyle/>
-          <a:p>
-            <a:r>
-              <a:rPr lang="ko-KR" altLang="en-US" sz="2400" spc="100" dirty="0">
-                <a:solidFill>
-                  <a:srgbClr val="44546A"/>
-                </a:solidFill>
-                <a:latin typeface="나눔스퀘어 Bold" panose="020B0600000101010101" pitchFamily="50" charset="-127"/>
-                <a:ea typeface="나눔스퀘어 Bold" panose="020B0600000101010101" pitchFamily="50" charset="-127"/>
-              </a:rPr>
-              <a:t>변수의 </a:t>
-            </a:r>
-            <a:r>
-              <a:rPr lang="ko-KR" altLang="en-US" sz="2400" spc="100" dirty="0" err="1">
-                <a:solidFill>
-                  <a:srgbClr val="44546A"/>
-                </a:solidFill>
-                <a:latin typeface="나눔스퀘어 Bold" panose="020B0600000101010101" pitchFamily="50" charset="-127"/>
-                <a:ea typeface="나눔스퀘어 Bold" panose="020B0600000101010101" pitchFamily="50" charset="-127"/>
-              </a:rPr>
-              <a:t>스코프는</a:t>
-            </a:r>
-            <a:r>
-              <a:rPr lang="ko-KR" altLang="en-US" sz="2400" spc="100" dirty="0">
-                <a:solidFill>
-                  <a:srgbClr val="44546A"/>
-                </a:solidFill>
-                <a:latin typeface="나눔스퀘어 Bold" panose="020B0600000101010101" pitchFamily="50" charset="-127"/>
-                <a:ea typeface="나눔스퀘어 Bold" panose="020B0600000101010101" pitchFamily="50" charset="-127"/>
-              </a:rPr>
-              <a:t> 좁을수록 좋다</a:t>
-            </a:r>
-            <a:r>
-              <a:rPr lang="en-US" altLang="ko-KR" sz="2400" spc="100" dirty="0">
-                <a:solidFill>
-                  <a:srgbClr val="44546A"/>
-                </a:solidFill>
-                <a:latin typeface="나눔스퀘어 Bold" panose="020B0600000101010101" pitchFamily="50" charset="-127"/>
-                <a:ea typeface="나눔스퀘어 Bold" panose="020B0600000101010101" pitchFamily="50" charset="-127"/>
-              </a:rPr>
-              <a:t>.</a:t>
-            </a:r>
-          </a:p>
-        </p:txBody>
-      </p:sp>
-      <p:sp>
-        <p:nvSpPr>
-          <p:cNvPr id="7" name="TextBox 6">
-            <a:extLst>
-              <a:ext uri="{FF2B5EF4-FFF2-40B4-BE49-F238E27FC236}">
-                <a16:creationId xmlns:a16="http://schemas.microsoft.com/office/drawing/2014/main" id="{4606FCED-B5C5-504C-8AC2-3FA7D42146AC}"/>
-              </a:ext>
-            </a:extLst>
-          </p:cNvPr>
-          <p:cNvSpPr txBox="1"/>
-          <p:nvPr/>
-        </p:nvSpPr>
-        <p:spPr>
-          <a:xfrm>
-            <a:off x="276223" y="310773"/>
-            <a:ext cx="6599706" cy="553998"/>
-          </a:xfrm>
-          <a:prstGeom prst="rect">
-            <a:avLst/>
-          </a:prstGeom>
-          <a:noFill/>
-        </p:spPr>
-        <p:txBody>
-          <a:bodyPr wrap="square" rtlCol="0">
-            <a:spAutoFit/>
-          </a:bodyPr>
-          <a:lstStyle/>
-          <a:p>
-            <a:r>
-              <a:rPr lang="en-US" altLang="ko-KR" sz="3000" spc="100" dirty="0">
-                <a:solidFill>
-                  <a:schemeClr val="tx2">
-                    <a:lumMod val="50000"/>
-                  </a:schemeClr>
-                </a:solidFill>
-                <a:latin typeface="나눔스퀘어 ExtraBold" panose="020B0600000101010101" pitchFamily="50" charset="-127"/>
-                <a:ea typeface="나눔스퀘어 ExtraBold" panose="020B0600000101010101" pitchFamily="50" charset="-127"/>
-              </a:rPr>
-              <a:t>3. </a:t>
-            </a:r>
-            <a:r>
-              <a:rPr lang="ko-KR" altLang="en-US" sz="3000" spc="100" dirty="0">
-                <a:solidFill>
-                  <a:schemeClr val="tx2">
-                    <a:lumMod val="50000"/>
-                  </a:schemeClr>
-                </a:solidFill>
-                <a:latin typeface="나눔스퀘어 ExtraBold" panose="020B0600000101010101" pitchFamily="50" charset="-127"/>
-                <a:ea typeface="나눔스퀘어 ExtraBold" panose="020B0600000101010101" pitchFamily="50" charset="-127"/>
-              </a:rPr>
-              <a:t>전역 변수의 사용을 억제하는 방법</a:t>
-            </a:r>
-          </a:p>
-        </p:txBody>
-      </p:sp>
-      <p:sp>
-        <p:nvSpPr>
-          <p:cNvPr id="10" name="TextBox 9">
-            <a:extLst>
-              <a:ext uri="{FF2B5EF4-FFF2-40B4-BE49-F238E27FC236}">
-                <a16:creationId xmlns:a16="http://schemas.microsoft.com/office/drawing/2014/main" id="{02AFF967-66B7-3EA3-20E6-621981EA5089}"/>
-              </a:ext>
-            </a:extLst>
-          </p:cNvPr>
-          <p:cNvSpPr txBox="1"/>
-          <p:nvPr/>
-        </p:nvSpPr>
-        <p:spPr>
-          <a:xfrm>
-            <a:off x="762855" y="1757177"/>
-            <a:ext cx="10680876" cy="461665"/>
-          </a:xfrm>
-          <a:prstGeom prst="rect">
-            <a:avLst/>
-          </a:prstGeom>
-          <a:noFill/>
-        </p:spPr>
-        <p:txBody>
-          <a:bodyPr wrap="square" rtlCol="0">
-            <a:spAutoFit/>
-          </a:bodyPr>
-          <a:lstStyle/>
-          <a:p>
-            <a:r>
-              <a:rPr lang="en-US" altLang="ko-KR" sz="2400" spc="100" dirty="0">
-                <a:solidFill>
-                  <a:srgbClr val="44546A"/>
-                </a:solidFill>
-                <a:latin typeface="나눔스퀘어 Bold" panose="020B0600000101010101" pitchFamily="50" charset="-127"/>
-                <a:ea typeface="나눔스퀘어 Bold" panose="020B0600000101010101" pitchFamily="50" charset="-127"/>
-              </a:rPr>
-              <a:t>	</a:t>
-            </a:r>
-            <a:r>
-              <a:rPr lang="ko-KR" altLang="en-US" sz="2400" spc="100" dirty="0">
-                <a:solidFill>
-                  <a:srgbClr val="44546A"/>
-                </a:solidFill>
-                <a:latin typeface="나눔스퀘어 Bold" panose="020B0600000101010101" pitchFamily="50" charset="-127"/>
-                <a:ea typeface="나눔스퀘어 Bold" panose="020B0600000101010101" pitchFamily="50" charset="-127"/>
-              </a:rPr>
-              <a:t>지역 변수를 사용해야 한다</a:t>
-            </a:r>
-            <a:r>
-              <a:rPr lang="en-US" altLang="ko-KR" sz="2400" spc="100" dirty="0">
-                <a:solidFill>
-                  <a:srgbClr val="44546A"/>
-                </a:solidFill>
-                <a:latin typeface="나눔스퀘어 Bold" panose="020B0600000101010101" pitchFamily="50" charset="-127"/>
-                <a:ea typeface="나눔스퀘어 Bold" panose="020B0600000101010101" pitchFamily="50" charset="-127"/>
-              </a:rPr>
-              <a:t>.</a:t>
-            </a:r>
-          </a:p>
-        </p:txBody>
-      </p:sp>
-      <p:sp>
-        <p:nvSpPr>
-          <p:cNvPr id="11" name="TextBox 10">
-            <a:extLst>
-              <a:ext uri="{FF2B5EF4-FFF2-40B4-BE49-F238E27FC236}">
-                <a16:creationId xmlns:a16="http://schemas.microsoft.com/office/drawing/2014/main" id="{AC81616C-D436-50EF-0464-ED62414C810A}"/>
-              </a:ext>
-            </a:extLst>
-          </p:cNvPr>
-          <p:cNvSpPr txBox="1"/>
-          <p:nvPr/>
-        </p:nvSpPr>
-        <p:spPr>
-          <a:xfrm>
-            <a:off x="755562" y="3499939"/>
-            <a:ext cx="10680876" cy="461665"/>
-          </a:xfrm>
-          <a:prstGeom prst="rect">
-            <a:avLst/>
-          </a:prstGeom>
-          <a:noFill/>
-        </p:spPr>
-        <p:txBody>
-          <a:bodyPr wrap="square" rtlCol="0">
-            <a:spAutoFit/>
-          </a:bodyPr>
-          <a:lstStyle/>
-          <a:p>
-            <a:r>
-              <a:rPr lang="en-US" altLang="ko-KR" sz="2400" spc="100" dirty="0">
-                <a:solidFill>
-                  <a:srgbClr val="44546A"/>
-                </a:solidFill>
-                <a:latin typeface="나눔스퀘어 Bold" panose="020B0600000101010101" pitchFamily="50" charset="-127"/>
-                <a:ea typeface="나눔스퀘어 Bold" panose="020B0600000101010101" pitchFamily="50" charset="-127"/>
-              </a:rPr>
-              <a:t>	 </a:t>
-            </a:r>
-            <a:r>
-              <a:rPr lang="ko-KR" altLang="en-US" sz="2400" spc="100" dirty="0">
-                <a:solidFill>
-                  <a:srgbClr val="44546A"/>
-                </a:solidFill>
-                <a:latin typeface="나눔스퀘어 Bold" panose="020B0600000101010101" pitchFamily="50" charset="-127"/>
-                <a:ea typeface="나눔스퀘어 Bold" panose="020B0600000101010101" pitchFamily="50" charset="-127"/>
-              </a:rPr>
-              <a:t>→ 전역 변수를 아예 쓰지 말란 이야기는 아니다</a:t>
-            </a:r>
-            <a:r>
-              <a:rPr lang="en-US" altLang="ko-KR" sz="2400" spc="100" dirty="0">
-                <a:solidFill>
-                  <a:srgbClr val="44546A"/>
-                </a:solidFill>
-                <a:latin typeface="나눔스퀘어 Bold" panose="020B0600000101010101" pitchFamily="50" charset="-127"/>
-                <a:ea typeface="나눔스퀘어 Bold" panose="020B0600000101010101" pitchFamily="50" charset="-127"/>
-              </a:rPr>
-              <a:t>.</a:t>
-            </a:r>
-          </a:p>
-        </p:txBody>
-      </p:sp>
-    </p:spTree>
-    <p:extLst>
-      <p:ext uri="{BB962C8B-B14F-4D97-AF65-F5344CB8AC3E}">
-        <p14:creationId xmlns:p14="http://schemas.microsoft.com/office/powerpoint/2010/main" val="1505249327"/>
-      </p:ext>
-    </p:extLst>
-  </p:cSld>
-  <p:clrMapOvr>
-    <a:masterClrMapping/>
-  </p:clrMapOvr>
-  <mc:AlternateContent xmlns:mc="http://schemas.openxmlformats.org/markup-compatibility/2006">
-    <mc:Choice xmlns:p159="http://schemas.microsoft.com/office/powerpoint/2015/09/main" Requires="p159">
-      <p:transition xmlns:p14="http://schemas.microsoft.com/office/powerpoint/2010/main" spd="slow" p14:dur="2000">
-        <p159:morph option="byObject"/>
-      </p:transition>
-    </mc:Choice>
-    <mc:Fallback>
-      <p:transition spd="slow">
-        <p:fade/>
-      </p:transition>
-    </mc:Fallback>
-  </mc:AlternateContent>
-</p:sld>
-</file>
-
-<file path=ppt/slides/slide13.xml><?xml version="1.0" encoding="utf-8"?>
-<p:sld xmlns:a="http://schemas.openxmlformats.org/drawingml/2006/main" xmlns:r="http://schemas.openxmlformats.org/officeDocument/2006/relationships" xmlns:p="http://schemas.openxmlformats.org/presentationml/2006/main">
-  <p:cSld>
-    <p:spTree>
-      <p:nvGrpSpPr>
-        <p:cNvPr id="1" name=""/>
-        <p:cNvGrpSpPr/>
-        <p:nvPr/>
-      </p:nvGrpSpPr>
-      <p:grpSpPr>
-        <a:xfrm>
-          <a:off x="0" y="0"/>
-          <a:ext cx="0" cy="0"/>
-          <a:chOff x="0" y="0"/>
-          <a:chExt cx="0" cy="0"/>
-        </a:xfrm>
-      </p:grpSpPr>
-      <p:cxnSp>
-        <p:nvCxnSpPr>
-          <p:cNvPr id="3" name="직선 연결선 2">
-            <a:extLst>
-              <a:ext uri="{FF2B5EF4-FFF2-40B4-BE49-F238E27FC236}">
-                <a16:creationId xmlns:a16="http://schemas.microsoft.com/office/drawing/2014/main" id="{F55676F0-C433-4456-BB57-3E5832581EF6}"/>
-              </a:ext>
-            </a:extLst>
-          </p:cNvPr>
-          <p:cNvCxnSpPr>
-            <a:cxnSpLocks/>
-          </p:cNvCxnSpPr>
-          <p:nvPr/>
-        </p:nvCxnSpPr>
-        <p:spPr>
-          <a:xfrm>
-            <a:off x="10337785" y="696814"/>
-            <a:ext cx="1577992" cy="0"/>
-          </a:xfrm>
-          <a:prstGeom prst="line">
-            <a:avLst/>
-          </a:prstGeom>
-          <a:ln w="34925">
-            <a:solidFill>
-              <a:schemeClr val="tx2"/>
-            </a:solidFill>
-          </a:ln>
-        </p:spPr>
-        <p:style>
-          <a:lnRef idx="1">
-            <a:schemeClr val="accent1"/>
-          </a:lnRef>
-          <a:fillRef idx="0">
-            <a:schemeClr val="accent1"/>
-          </a:fillRef>
-          <a:effectRef idx="0">
-            <a:schemeClr val="accent1"/>
-          </a:effectRef>
-          <a:fontRef idx="minor">
-            <a:schemeClr val="tx1"/>
-          </a:fontRef>
-        </p:style>
-      </p:cxnSp>
-      <p:sp>
-        <p:nvSpPr>
-          <p:cNvPr id="6" name="TextBox 5">
-            <a:extLst>
-              <a:ext uri="{FF2B5EF4-FFF2-40B4-BE49-F238E27FC236}">
-                <a16:creationId xmlns:a16="http://schemas.microsoft.com/office/drawing/2014/main" id="{C7B00371-8BBF-468F-BAB5-3B58CE59B669}"/>
-              </a:ext>
-            </a:extLst>
-          </p:cNvPr>
-          <p:cNvSpPr txBox="1"/>
-          <p:nvPr/>
-        </p:nvSpPr>
-        <p:spPr>
-          <a:xfrm>
-            <a:off x="10337785" y="310773"/>
-            <a:ext cx="1577991" cy="400110"/>
-          </a:xfrm>
-          <a:prstGeom prst="rect">
-            <a:avLst/>
-          </a:prstGeom>
-          <a:noFill/>
-        </p:spPr>
-        <p:txBody>
-          <a:bodyPr wrap="square" rtlCol="0">
-            <a:spAutoFit/>
-          </a:bodyPr>
-          <a:lstStyle/>
-          <a:p>
-            <a:pPr algn="ctr"/>
-            <a:r>
-              <a:rPr lang="ko-KR" altLang="en-US" sz="2000" dirty="0" err="1">
-                <a:solidFill>
-                  <a:schemeClr val="tx2">
-                    <a:lumMod val="50000"/>
-                  </a:schemeClr>
-                </a:solidFill>
-                <a:latin typeface="나눔스퀘어 ExtraBold" panose="020B0600000101010101" pitchFamily="50" charset="-127"/>
-                <a:ea typeface="나눔스퀘어 ExtraBold" panose="020B0600000101010101" pitchFamily="50" charset="-127"/>
-              </a:rPr>
-              <a:t>컴공특</a:t>
-            </a:r>
-            <a:r>
-              <a:rPr lang="ko-KR" altLang="en-US" sz="2000" dirty="0">
-                <a:solidFill>
-                  <a:schemeClr val="tx2">
-                    <a:lumMod val="50000"/>
-                  </a:schemeClr>
-                </a:solidFill>
-                <a:latin typeface="나눔스퀘어 ExtraBold" panose="020B0600000101010101" pitchFamily="50" charset="-127"/>
-                <a:ea typeface="나눔스퀘어 ExtraBold" panose="020B0600000101010101" pitchFamily="50" charset="-127"/>
-              </a:rPr>
-              <a:t> </a:t>
-            </a:r>
-            <a:r>
-              <a:rPr lang="en-US" altLang="ko-KR" sz="2000" dirty="0">
-                <a:solidFill>
-                  <a:schemeClr val="tx2">
-                    <a:lumMod val="50000"/>
-                  </a:schemeClr>
-                </a:solidFill>
-                <a:latin typeface="나눔스퀘어 ExtraBold" panose="020B0600000101010101" pitchFamily="50" charset="-127"/>
-                <a:ea typeface="나눔스퀘어 ExtraBold" panose="020B0600000101010101" pitchFamily="50" charset="-127"/>
-              </a:rPr>
-              <a:t>3</a:t>
-            </a:r>
-            <a:r>
-              <a:rPr lang="ko-KR" altLang="en-US" sz="2000" dirty="0">
-                <a:solidFill>
-                  <a:schemeClr val="tx2">
-                    <a:lumMod val="50000"/>
-                  </a:schemeClr>
-                </a:solidFill>
-                <a:latin typeface="나눔스퀘어 ExtraBold" panose="020B0600000101010101" pitchFamily="50" charset="-127"/>
-                <a:ea typeface="나눔스퀘어 ExtraBold" panose="020B0600000101010101" pitchFamily="50" charset="-127"/>
-              </a:rPr>
-              <a:t>팀</a:t>
-            </a:r>
-            <a:endParaRPr lang="en-US" altLang="ko-KR" sz="2000" dirty="0">
-              <a:solidFill>
-                <a:schemeClr val="tx2">
-                  <a:lumMod val="50000"/>
-                </a:schemeClr>
-              </a:solidFill>
-              <a:latin typeface="나눔스퀘어 ExtraBold" panose="020B0600000101010101" pitchFamily="50" charset="-127"/>
-              <a:ea typeface="나눔스퀘어 ExtraBold" panose="020B0600000101010101" pitchFamily="50" charset="-127"/>
-            </a:endParaRPr>
-          </a:p>
-        </p:txBody>
-      </p:sp>
-      <p:cxnSp>
-        <p:nvCxnSpPr>
-          <p:cNvPr id="9" name="직선 연결선 8">
-            <a:extLst>
-              <a:ext uri="{FF2B5EF4-FFF2-40B4-BE49-F238E27FC236}">
-                <a16:creationId xmlns:a16="http://schemas.microsoft.com/office/drawing/2014/main" id="{5140239F-7841-40D4-B023-7486FD09274D}"/>
-              </a:ext>
-            </a:extLst>
-          </p:cNvPr>
-          <p:cNvCxnSpPr>
-            <a:cxnSpLocks/>
-          </p:cNvCxnSpPr>
-          <p:nvPr/>
-        </p:nvCxnSpPr>
-        <p:spPr>
-          <a:xfrm>
-            <a:off x="10337785" y="267285"/>
-            <a:ext cx="1577992" cy="0"/>
-          </a:xfrm>
-          <a:prstGeom prst="line">
-            <a:avLst/>
-          </a:prstGeom>
-          <a:ln w="34925">
-            <a:solidFill>
-              <a:schemeClr val="tx2"/>
-            </a:solidFill>
-          </a:ln>
-        </p:spPr>
-        <p:style>
-          <a:lnRef idx="1">
-            <a:schemeClr val="accent1"/>
-          </a:lnRef>
-          <a:fillRef idx="0">
-            <a:schemeClr val="accent1"/>
-          </a:fillRef>
-          <a:effectRef idx="0">
-            <a:schemeClr val="accent1"/>
-          </a:effectRef>
-          <a:fontRef idx="minor">
-            <a:schemeClr val="tx1"/>
-          </a:fontRef>
-        </p:style>
-      </p:cxnSp>
-      <p:sp>
-        <p:nvSpPr>
-          <p:cNvPr id="17" name="TextBox 16">
-            <a:extLst>
-              <a:ext uri="{FF2B5EF4-FFF2-40B4-BE49-F238E27FC236}">
-                <a16:creationId xmlns:a16="http://schemas.microsoft.com/office/drawing/2014/main" id="{EF93F456-2C49-4A85-B01B-2D6BD46D6E98}"/>
-              </a:ext>
-            </a:extLst>
-          </p:cNvPr>
-          <p:cNvSpPr txBox="1"/>
-          <p:nvPr/>
-        </p:nvSpPr>
-        <p:spPr>
-          <a:xfrm>
-            <a:off x="762855" y="1295512"/>
-            <a:ext cx="10680876" cy="461665"/>
-          </a:xfrm>
-          <a:prstGeom prst="rect">
-            <a:avLst/>
-          </a:prstGeom>
-          <a:noFill/>
-        </p:spPr>
-        <p:txBody>
-          <a:bodyPr wrap="square" rtlCol="0">
-            <a:spAutoFit/>
-          </a:bodyPr>
-          <a:lstStyle/>
-          <a:p>
-            <a:r>
-              <a:rPr lang="ko-KR" altLang="en-US" sz="2400" spc="100" dirty="0">
-                <a:solidFill>
-                  <a:srgbClr val="44546A"/>
-                </a:solidFill>
-                <a:latin typeface="나눔스퀘어 Bold" panose="020B0600000101010101" pitchFamily="50" charset="-127"/>
-                <a:ea typeface="나눔스퀘어 Bold" panose="020B0600000101010101" pitchFamily="50" charset="-127"/>
-              </a:rPr>
-              <a:t>전역 변수를 반드시 사용해야 할 이유를 찾지 못한다면</a:t>
-            </a:r>
-            <a:endParaRPr lang="en-US" altLang="ko-KR" sz="2400" spc="100" dirty="0">
-              <a:solidFill>
-                <a:srgbClr val="44546A"/>
-              </a:solidFill>
-              <a:latin typeface="나눔스퀘어 Bold" panose="020B0600000101010101" pitchFamily="50" charset="-127"/>
-              <a:ea typeface="나눔스퀘어 Bold" panose="020B0600000101010101" pitchFamily="50" charset="-127"/>
-            </a:endParaRPr>
-          </a:p>
-        </p:txBody>
-      </p:sp>
-      <p:sp>
-        <p:nvSpPr>
-          <p:cNvPr id="2" name="TextBox 1">
-            <a:extLst>
-              <a:ext uri="{FF2B5EF4-FFF2-40B4-BE49-F238E27FC236}">
-                <a16:creationId xmlns:a16="http://schemas.microsoft.com/office/drawing/2014/main" id="{2EB84E09-966C-F46D-B211-890C52264C2E}"/>
-              </a:ext>
-            </a:extLst>
-          </p:cNvPr>
-          <p:cNvSpPr txBox="1"/>
-          <p:nvPr/>
-        </p:nvSpPr>
-        <p:spPr>
-          <a:xfrm>
-            <a:off x="8802448" y="267286"/>
-            <a:ext cx="1183644" cy="461665"/>
-          </a:xfrm>
-          <a:prstGeom prst="rect">
-            <a:avLst/>
-          </a:prstGeom>
-          <a:noFill/>
-        </p:spPr>
-        <p:txBody>
-          <a:bodyPr wrap="square" rtlCol="0">
-            <a:spAutoFit/>
-          </a:bodyPr>
-          <a:lstStyle/>
-          <a:p>
-            <a:r>
-              <a:rPr lang="en-US" altLang="ko-KR" sz="2400" spc="100" dirty="0">
-                <a:solidFill>
-                  <a:srgbClr val="000000"/>
-                </a:solidFill>
-                <a:latin typeface="나눔스퀘어 Bold" panose="020B0600000101010101" pitchFamily="50" charset="-127"/>
-                <a:ea typeface="나눔스퀘어 Bold" panose="020B0600000101010101" pitchFamily="50" charset="-127"/>
-              </a:rPr>
-              <a:t>p.</a:t>
-            </a:r>
-            <a:r>
-              <a:rPr lang="ko-KR" altLang="en-US" sz="2400" spc="100" dirty="0">
-                <a:solidFill>
-                  <a:srgbClr val="000000"/>
-                </a:solidFill>
-                <a:latin typeface="나눔스퀘어 Bold" panose="020B0600000101010101" pitchFamily="50" charset="-127"/>
-                <a:ea typeface="나눔스퀘어 Bold" panose="020B0600000101010101" pitchFamily="50" charset="-127"/>
-              </a:rPr>
-              <a:t> </a:t>
-            </a:r>
-            <a:r>
-              <a:rPr lang="en-US" altLang="ko-KR" sz="2400" spc="100" dirty="0">
-                <a:solidFill>
-                  <a:srgbClr val="000000"/>
-                </a:solidFill>
-                <a:latin typeface="나눔스퀘어 Bold" panose="020B0600000101010101" pitchFamily="50" charset="-127"/>
-                <a:ea typeface="나눔스퀘어 Bold" panose="020B0600000101010101" pitchFamily="50" charset="-127"/>
-              </a:rPr>
-              <a:t>204</a:t>
-            </a:r>
-            <a:endParaRPr lang="ko-KR" altLang="en-US" sz="2400" spc="100" dirty="0">
-              <a:solidFill>
-                <a:srgbClr val="000000"/>
-              </a:solidFill>
-              <a:latin typeface="나눔스퀘어 Bold" panose="020B0600000101010101" pitchFamily="50" charset="-127"/>
-              <a:ea typeface="나눔스퀘어 Bold" panose="020B0600000101010101" pitchFamily="50" charset="-127"/>
-            </a:endParaRPr>
-          </a:p>
-        </p:txBody>
-      </p:sp>
-      <p:sp>
-        <p:nvSpPr>
-          <p:cNvPr id="4" name="TextBox 3">
-            <a:extLst>
-              <a:ext uri="{FF2B5EF4-FFF2-40B4-BE49-F238E27FC236}">
-                <a16:creationId xmlns:a16="http://schemas.microsoft.com/office/drawing/2014/main" id="{DC8BBE5B-E8D7-C054-A95F-7CFAC419A57B}"/>
-              </a:ext>
-            </a:extLst>
-          </p:cNvPr>
-          <p:cNvSpPr txBox="1"/>
-          <p:nvPr/>
-        </p:nvSpPr>
-        <p:spPr>
-          <a:xfrm>
-            <a:off x="762855" y="2601279"/>
-            <a:ext cx="10680876" cy="461665"/>
-          </a:xfrm>
-          <a:prstGeom prst="rect">
-            <a:avLst/>
-          </a:prstGeom>
-          <a:noFill/>
-        </p:spPr>
-        <p:txBody>
-          <a:bodyPr wrap="square" rtlCol="0">
-            <a:spAutoFit/>
-          </a:bodyPr>
-          <a:lstStyle/>
-          <a:p>
-            <a:r>
-              <a:rPr lang="ko-KR" altLang="en-US" sz="2400" spc="100" dirty="0">
-                <a:solidFill>
-                  <a:srgbClr val="44546A"/>
-                </a:solidFill>
-                <a:latin typeface="나눔스퀘어 Bold" panose="020B0600000101010101" pitchFamily="50" charset="-127"/>
-                <a:ea typeface="나눔스퀘어 Bold" panose="020B0600000101010101" pitchFamily="50" charset="-127"/>
-              </a:rPr>
-              <a:t>변수의 </a:t>
-            </a:r>
-            <a:r>
-              <a:rPr lang="ko-KR" altLang="en-US" sz="2400" spc="100" dirty="0" err="1">
-                <a:solidFill>
-                  <a:srgbClr val="44546A"/>
-                </a:solidFill>
-                <a:latin typeface="나눔스퀘어 Bold" panose="020B0600000101010101" pitchFamily="50" charset="-127"/>
-                <a:ea typeface="나눔스퀘어 Bold" panose="020B0600000101010101" pitchFamily="50" charset="-127"/>
-              </a:rPr>
-              <a:t>스코프는</a:t>
-            </a:r>
-            <a:r>
-              <a:rPr lang="ko-KR" altLang="en-US" sz="2400" spc="100" dirty="0">
-                <a:solidFill>
-                  <a:srgbClr val="44546A"/>
-                </a:solidFill>
-                <a:latin typeface="나눔스퀘어 Bold" panose="020B0600000101010101" pitchFamily="50" charset="-127"/>
-                <a:ea typeface="나눔스퀘어 Bold" panose="020B0600000101010101" pitchFamily="50" charset="-127"/>
-              </a:rPr>
-              <a:t> 좁을수록 좋다</a:t>
-            </a:r>
-            <a:r>
-              <a:rPr lang="en-US" altLang="ko-KR" sz="2400" spc="100" dirty="0">
-                <a:solidFill>
-                  <a:srgbClr val="44546A"/>
-                </a:solidFill>
-                <a:latin typeface="나눔스퀘어 Bold" panose="020B0600000101010101" pitchFamily="50" charset="-127"/>
-                <a:ea typeface="나눔스퀘어 Bold" panose="020B0600000101010101" pitchFamily="50" charset="-127"/>
-              </a:rPr>
-              <a:t>.</a:t>
-            </a:r>
-          </a:p>
-        </p:txBody>
-      </p:sp>
-      <p:sp>
-        <p:nvSpPr>
-          <p:cNvPr id="7" name="TextBox 6">
-            <a:extLst>
-              <a:ext uri="{FF2B5EF4-FFF2-40B4-BE49-F238E27FC236}">
-                <a16:creationId xmlns:a16="http://schemas.microsoft.com/office/drawing/2014/main" id="{4606FCED-B5C5-504C-8AC2-3FA7D42146AC}"/>
-              </a:ext>
-            </a:extLst>
-          </p:cNvPr>
-          <p:cNvSpPr txBox="1"/>
-          <p:nvPr/>
-        </p:nvSpPr>
-        <p:spPr>
-          <a:xfrm>
-            <a:off x="276223" y="310773"/>
-            <a:ext cx="6599706" cy="553998"/>
-          </a:xfrm>
-          <a:prstGeom prst="rect">
-            <a:avLst/>
-          </a:prstGeom>
-          <a:noFill/>
-        </p:spPr>
-        <p:txBody>
-          <a:bodyPr wrap="square" rtlCol="0">
-            <a:spAutoFit/>
-          </a:bodyPr>
-          <a:lstStyle/>
-          <a:p>
-            <a:r>
-              <a:rPr lang="en-US" altLang="ko-KR" sz="3000" spc="100" dirty="0">
-                <a:solidFill>
-                  <a:schemeClr val="tx2">
-                    <a:lumMod val="50000"/>
-                  </a:schemeClr>
-                </a:solidFill>
-                <a:latin typeface="나눔스퀘어 ExtraBold" panose="020B0600000101010101" pitchFamily="50" charset="-127"/>
-                <a:ea typeface="나눔스퀘어 ExtraBold" panose="020B0600000101010101" pitchFamily="50" charset="-127"/>
-              </a:rPr>
-              <a:t>3. </a:t>
-            </a:r>
-            <a:r>
-              <a:rPr lang="ko-KR" altLang="en-US" sz="3000" spc="100" dirty="0">
-                <a:solidFill>
-                  <a:schemeClr val="tx2">
-                    <a:lumMod val="50000"/>
-                  </a:schemeClr>
-                </a:solidFill>
-                <a:latin typeface="나눔스퀘어 ExtraBold" panose="020B0600000101010101" pitchFamily="50" charset="-127"/>
-                <a:ea typeface="나눔스퀘어 ExtraBold" panose="020B0600000101010101" pitchFamily="50" charset="-127"/>
-              </a:rPr>
-              <a:t>전역 변수의 사용을 억제하는 방법</a:t>
-            </a:r>
-          </a:p>
-        </p:txBody>
-      </p:sp>
-      <p:sp>
-        <p:nvSpPr>
-          <p:cNvPr id="10" name="TextBox 9">
-            <a:extLst>
-              <a:ext uri="{FF2B5EF4-FFF2-40B4-BE49-F238E27FC236}">
-                <a16:creationId xmlns:a16="http://schemas.microsoft.com/office/drawing/2014/main" id="{02AFF967-66B7-3EA3-20E6-621981EA5089}"/>
-              </a:ext>
-            </a:extLst>
-          </p:cNvPr>
-          <p:cNvSpPr txBox="1"/>
-          <p:nvPr/>
-        </p:nvSpPr>
-        <p:spPr>
-          <a:xfrm>
-            <a:off x="762855" y="1757177"/>
-            <a:ext cx="10680876" cy="461665"/>
-          </a:xfrm>
-          <a:prstGeom prst="rect">
-            <a:avLst/>
-          </a:prstGeom>
-          <a:noFill/>
-        </p:spPr>
-        <p:txBody>
-          <a:bodyPr wrap="square" rtlCol="0">
-            <a:spAutoFit/>
-          </a:bodyPr>
-          <a:lstStyle/>
-          <a:p>
-            <a:r>
-              <a:rPr lang="en-US" altLang="ko-KR" sz="2400" spc="100" dirty="0">
-                <a:solidFill>
-                  <a:srgbClr val="44546A"/>
-                </a:solidFill>
-                <a:latin typeface="나눔스퀘어 Bold" panose="020B0600000101010101" pitchFamily="50" charset="-127"/>
-                <a:ea typeface="나눔스퀘어 Bold" panose="020B0600000101010101" pitchFamily="50" charset="-127"/>
-              </a:rPr>
-              <a:t>	</a:t>
-            </a:r>
-            <a:r>
-              <a:rPr lang="ko-KR" altLang="en-US" sz="2400" spc="100" dirty="0">
-                <a:solidFill>
-                  <a:srgbClr val="44546A"/>
-                </a:solidFill>
-                <a:latin typeface="나눔스퀘어 Bold" panose="020B0600000101010101" pitchFamily="50" charset="-127"/>
-                <a:ea typeface="나눔스퀘어 Bold" panose="020B0600000101010101" pitchFamily="50" charset="-127"/>
-              </a:rPr>
-              <a:t>지역 변수를 사용해야 한다</a:t>
-            </a:r>
-            <a:r>
-              <a:rPr lang="en-US" altLang="ko-KR" sz="2400" spc="100" dirty="0">
-                <a:solidFill>
-                  <a:srgbClr val="44546A"/>
-                </a:solidFill>
-                <a:latin typeface="나눔스퀘어 Bold" panose="020B0600000101010101" pitchFamily="50" charset="-127"/>
-                <a:ea typeface="나눔스퀘어 Bold" panose="020B0600000101010101" pitchFamily="50" charset="-127"/>
-              </a:rPr>
-              <a:t>.</a:t>
-            </a:r>
-          </a:p>
-        </p:txBody>
-      </p:sp>
-      <p:sp>
-        <p:nvSpPr>
-          <p:cNvPr id="11" name="TextBox 10">
-            <a:extLst>
-              <a:ext uri="{FF2B5EF4-FFF2-40B4-BE49-F238E27FC236}">
-                <a16:creationId xmlns:a16="http://schemas.microsoft.com/office/drawing/2014/main" id="{AC81616C-D436-50EF-0464-ED62414C810A}"/>
-              </a:ext>
-            </a:extLst>
-          </p:cNvPr>
-          <p:cNvSpPr txBox="1"/>
-          <p:nvPr/>
-        </p:nvSpPr>
-        <p:spPr>
-          <a:xfrm>
-            <a:off x="755562" y="3499939"/>
-            <a:ext cx="10680876" cy="461665"/>
-          </a:xfrm>
-          <a:prstGeom prst="rect">
-            <a:avLst/>
-          </a:prstGeom>
-          <a:noFill/>
-        </p:spPr>
-        <p:txBody>
-          <a:bodyPr wrap="square" rtlCol="0">
-            <a:spAutoFit/>
-          </a:bodyPr>
-          <a:lstStyle/>
-          <a:p>
-            <a:r>
-              <a:rPr lang="en-US" altLang="ko-KR" sz="2400" spc="100" dirty="0">
-                <a:solidFill>
-                  <a:srgbClr val="44546A"/>
-                </a:solidFill>
-                <a:latin typeface="나눔스퀘어 Bold" panose="020B0600000101010101" pitchFamily="50" charset="-127"/>
-                <a:ea typeface="나눔스퀘어 Bold" panose="020B0600000101010101" pitchFamily="50" charset="-127"/>
-              </a:rPr>
-              <a:t>	 </a:t>
-            </a:r>
-            <a:r>
-              <a:rPr lang="ko-KR" altLang="en-US" sz="2400" spc="100" dirty="0">
-                <a:solidFill>
-                  <a:srgbClr val="44546A"/>
-                </a:solidFill>
-                <a:latin typeface="나눔스퀘어 Bold" panose="020B0600000101010101" pitchFamily="50" charset="-127"/>
-                <a:ea typeface="나눔스퀘어 Bold" panose="020B0600000101010101" pitchFamily="50" charset="-127"/>
-              </a:rPr>
-              <a:t>→ 전역 변수를 아예 쓰지 말란 이야기는 아니다</a:t>
-            </a:r>
-            <a:r>
-              <a:rPr lang="en-US" altLang="ko-KR" sz="2400" spc="100" dirty="0">
-                <a:solidFill>
-                  <a:srgbClr val="44546A"/>
-                </a:solidFill>
-                <a:latin typeface="나눔스퀘어 Bold" panose="020B0600000101010101" pitchFamily="50" charset="-127"/>
-                <a:ea typeface="나눔스퀘어 Bold" panose="020B0600000101010101" pitchFamily="50" charset="-127"/>
-              </a:rPr>
-              <a:t>.</a:t>
-            </a:r>
-          </a:p>
-        </p:txBody>
-      </p:sp>
-    </p:spTree>
-    <p:extLst>
-      <p:ext uri="{BB962C8B-B14F-4D97-AF65-F5344CB8AC3E}">
-        <p14:creationId xmlns:p14="http://schemas.microsoft.com/office/powerpoint/2010/main" val="2511699215"/>
-      </p:ext>
-    </p:extLst>
-  </p:cSld>
-  <p:clrMapOvr>
-    <a:masterClrMapping/>
-  </p:clrMapOvr>
-  <mc:AlternateContent xmlns:mc="http://schemas.openxmlformats.org/markup-compatibility/2006">
-    <mc:Choice xmlns:p159="http://schemas.microsoft.com/office/powerpoint/2015/09/main" Requires="p159">
-      <p:transition xmlns:p14="http://schemas.microsoft.com/office/powerpoint/2010/main" spd="slow" p14:dur="2000">
-        <p159:morph option="byObject"/>
-      </p:transition>
-    </mc:Choice>
-    <mc:Fallback>
-      <p:transition spd="slow">
-        <p:fade/>
-      </p:transition>
-    </mc:Fallback>
-  </mc:AlternateContent>
-</p:sld>
-</file>
-
-<file path=ppt/slides/slide14.xml><?xml version="1.0" encoding="utf-8"?>
 <p:sld xmlns:a="http://schemas.openxmlformats.org/drawingml/2006/main" xmlns:r="http://schemas.openxmlformats.org/officeDocument/2006/relationships" xmlns:p="http://schemas.openxmlformats.org/presentationml/2006/main">
   <p:cSld>
     <p:spTree>
@@ -7711,7 +6569,7 @@
         </p:nvSpPr>
         <p:spPr>
           <a:xfrm>
-            <a:off x="276223" y="857337"/>
+            <a:off x="276223" y="873405"/>
             <a:ext cx="11339630" cy="523220"/>
           </a:xfrm>
           <a:prstGeom prst="rect">
@@ -7725,7 +6583,6 @@
           </a:bodyPr>
           <a:lstStyle/>
           <a:p>
-            <a:pPr algn="ctr"/>
             <a:r>
               <a:rPr lang="en-US" altLang="ko-KR" sz="2800" b="1" spc="100" dirty="0">
                 <a:solidFill>
@@ -7734,7 +6591,7 @@
                 <a:latin typeface="나눔스퀘어 Bold" panose="020B0600000101010101" pitchFamily="50" charset="-127"/>
                 <a:ea typeface="나눔스퀘어 Bold" panose="020B0600000101010101" pitchFamily="50" charset="-127"/>
               </a:rPr>
-              <a:t>14.1.1</a:t>
+              <a:t> - </a:t>
             </a:r>
             <a:r>
               <a:rPr lang="ko-KR" altLang="en-US" sz="2800" b="1" spc="100" dirty="0">
@@ -7744,7 +6601,7 @@
                 <a:latin typeface="나눔스퀘어 Bold" panose="020B0600000101010101" pitchFamily="50" charset="-127"/>
                 <a:ea typeface="나눔스퀘어 Bold" panose="020B0600000101010101" pitchFamily="50" charset="-127"/>
               </a:rPr>
-              <a:t> 지역 변수의 생명 주기</a:t>
+              <a:t>지역 변수의 생명 주기</a:t>
             </a:r>
             <a:endParaRPr lang="en-US" altLang="ko-KR" sz="2800" b="1" spc="100" dirty="0">
               <a:solidFill>
@@ -7812,7 +6669,7 @@
                 <a:latin typeface="나눔스퀘어 Bold" panose="020B0600000101010101" pitchFamily="50" charset="-127"/>
                 <a:ea typeface="나눔스퀘어 Bold" panose="020B0600000101010101" pitchFamily="50" charset="-127"/>
               </a:rPr>
-              <a:t>203</a:t>
+              <a:t>200</a:t>
             </a:r>
             <a:endParaRPr lang="ko-KR" altLang="en-US" sz="2400" spc="100" dirty="0">
               <a:solidFill>
@@ -7923,8 +6780,11 @@
           </a:bodyPr>
           <a:lstStyle/>
           <a:p>
-            <a:r>
-              <a:rPr lang="en-US" altLang="ko-KR" sz="3000" spc="100" dirty="0">
+            <a:pPr marL="514350" indent="-514350">
+              <a:buAutoNum type="arabicPeriod"/>
+            </a:pPr>
+            <a:r>
+              <a:rPr lang="ko-KR" altLang="en-US" sz="3000" spc="100" dirty="0">
                 <a:solidFill>
                   <a:schemeClr val="tx2">
                     <a:lumMod val="50000"/>
@@ -7933,20 +6793,17 @@
                 <a:latin typeface="나눔스퀘어 ExtraBold" panose="020B0600000101010101" pitchFamily="50" charset="-127"/>
                 <a:ea typeface="나눔스퀘어 ExtraBold" panose="020B0600000101010101" pitchFamily="50" charset="-127"/>
               </a:rPr>
-              <a:t>1.</a:t>
-            </a:r>
-            <a:r>
-              <a:rPr lang="ko-KR" altLang="en-US" sz="3000" spc="100" dirty="0">
-                <a:solidFill>
-                  <a:schemeClr val="tx2">
-                    <a:lumMod val="50000"/>
-                  </a:schemeClr>
-                </a:solidFill>
-                <a:latin typeface="나눔스퀘어 ExtraBold" panose="020B0600000101010101" pitchFamily="50" charset="-127"/>
-                <a:ea typeface="나눔스퀘어 ExtraBold" panose="020B0600000101010101" pitchFamily="50" charset="-127"/>
-              </a:rPr>
-              <a:t> 변수의 생명 주기</a:t>
-            </a:r>
+              <a:t>변수의 생명 주기</a:t>
+            </a:r>
+            <a:endParaRPr lang="en-US" altLang="ko-KR" sz="3000" spc="100" dirty="0">
+              <a:solidFill>
+                <a:schemeClr val="tx2">
+                  <a:lumMod val="50000"/>
+                </a:schemeClr>
+              </a:solidFill>
+              <a:latin typeface="나눔스퀘어 ExtraBold" panose="020B0600000101010101" pitchFamily="50" charset="-127"/>
+              <a:ea typeface="나눔스퀘어 ExtraBold" panose="020B0600000101010101" pitchFamily="50" charset="-127"/>
+            </a:endParaRPr>
           </a:p>
         </p:txBody>
       </p:sp>
@@ -8580,10 +7437,10 @@
       </p:cxnSp>
       <p:sp>
         <p:nvSpPr>
-          <p:cNvPr id="17" name="TextBox 16">
-            <a:extLst>
-              <a:ext uri="{FF2B5EF4-FFF2-40B4-BE49-F238E27FC236}">
-                <a16:creationId xmlns:a16="http://schemas.microsoft.com/office/drawing/2014/main" id="{EF93F456-2C49-4A85-B01B-2D6BD46D6E98}"/>
+          <p:cNvPr id="2" name="TextBox 1">
+            <a:extLst>
+              <a:ext uri="{FF2B5EF4-FFF2-40B4-BE49-F238E27FC236}">
+                <a16:creationId xmlns:a16="http://schemas.microsoft.com/office/drawing/2014/main" id="{2EB84E09-966C-F46D-B211-890C52264C2E}"/>
               </a:ext>
             </a:extLst>
           </p:cNvPr>
@@ -8592,8 +7449,8 @@
         </p:nvSpPr>
         <p:spPr>
           <a:xfrm>
-            <a:off x="276223" y="857337"/>
-            <a:ext cx="11339630" cy="523220"/>
+            <a:off x="8802448" y="267286"/>
+            <a:ext cx="1183644" cy="461665"/>
           </a:xfrm>
           <a:prstGeom prst="rect">
             <a:avLst/>
@@ -8606,65 +7463,6 @@
           </a:bodyPr>
           <a:lstStyle/>
           <a:p>
-            <a:pPr algn="ctr"/>
-            <a:r>
-              <a:rPr lang="en-US" altLang="ko-KR" sz="2800" b="1" spc="100" dirty="0">
-                <a:solidFill>
-                  <a:srgbClr val="44546A"/>
-                </a:solidFill>
-                <a:latin typeface="나눔스퀘어 Bold" panose="020B0600000101010101" pitchFamily="50" charset="-127"/>
-                <a:ea typeface="나눔스퀘어 Bold" panose="020B0600000101010101" pitchFamily="50" charset="-127"/>
-              </a:rPr>
-              <a:t>14.1.1</a:t>
-            </a:r>
-            <a:r>
-              <a:rPr lang="ko-KR" altLang="en-US" sz="2800" b="1" spc="100" dirty="0">
-                <a:solidFill>
-                  <a:srgbClr val="44546A"/>
-                </a:solidFill>
-                <a:latin typeface="나눔스퀘어 Bold" panose="020B0600000101010101" pitchFamily="50" charset="-127"/>
-                <a:ea typeface="나눔스퀘어 Bold" panose="020B0600000101010101" pitchFamily="50" charset="-127"/>
-              </a:rPr>
-              <a:t> 지역 변수의 생명 주기</a:t>
-            </a:r>
-            <a:endParaRPr lang="en-US" altLang="ko-KR" sz="2800" b="1" spc="100" dirty="0">
-              <a:solidFill>
-                <a:srgbClr val="44546A"/>
-              </a:solidFill>
-              <a:latin typeface="나눔스퀘어 Bold" panose="020B0600000101010101" pitchFamily="50" charset="-127"/>
-              <a:ea typeface="나눔스퀘어 Bold" panose="020B0600000101010101" pitchFamily="50" charset="-127"/>
-            </a:endParaRPr>
-          </a:p>
-        </p:txBody>
-      </p:sp>
-      <p:sp>
-        <p:nvSpPr>
-          <p:cNvPr id="2" name="TextBox 1">
-            <a:extLst>
-              <a:ext uri="{FF2B5EF4-FFF2-40B4-BE49-F238E27FC236}">
-                <a16:creationId xmlns:a16="http://schemas.microsoft.com/office/drawing/2014/main" id="{2EB84E09-966C-F46D-B211-890C52264C2E}"/>
-              </a:ext>
-            </a:extLst>
-          </p:cNvPr>
-          <p:cNvSpPr txBox="1"/>
-          <p:nvPr/>
-        </p:nvSpPr>
-        <p:spPr>
-          <a:xfrm>
-            <a:off x="8802448" y="267286"/>
-            <a:ext cx="1183644" cy="461665"/>
-          </a:xfrm>
-          <a:prstGeom prst="rect">
-            <a:avLst/>
-          </a:prstGeom>
-          <a:noFill/>
-        </p:spPr>
-        <p:txBody>
-          <a:bodyPr wrap="square" rtlCol="0">
-            <a:spAutoFit/>
-          </a:bodyPr>
-          <a:lstStyle/>
-          <a:p>
             <a:r>
               <a:rPr lang="en-US" altLang="ko-KR" sz="2400" spc="100" dirty="0">
                 <a:solidFill>
@@ -8693,7 +7491,7 @@
                 <a:latin typeface="나눔스퀘어 Bold" panose="020B0600000101010101" pitchFamily="50" charset="-127"/>
                 <a:ea typeface="나눔스퀘어 Bold" panose="020B0600000101010101" pitchFamily="50" charset="-127"/>
               </a:rPr>
-              <a:t>203</a:t>
+              <a:t>200</a:t>
             </a:r>
             <a:endParaRPr lang="ko-KR" altLang="en-US" sz="2400" spc="100" dirty="0">
               <a:solidFill>
@@ -8988,6 +7786,64 @@
           </a:prstGeom>
         </p:spPr>
       </p:pic>
+      <p:sp>
+        <p:nvSpPr>
+          <p:cNvPr id="4" name="TextBox 3">
+            <a:extLst>
+              <a:ext uri="{FF2B5EF4-FFF2-40B4-BE49-F238E27FC236}">
+                <a16:creationId xmlns:a16="http://schemas.microsoft.com/office/drawing/2014/main" id="{90711EC9-A46C-4057-F069-DB7DED43E919}"/>
+              </a:ext>
+            </a:extLst>
+          </p:cNvPr>
+          <p:cNvSpPr txBox="1"/>
+          <p:nvPr/>
+        </p:nvSpPr>
+        <p:spPr>
+          <a:xfrm>
+            <a:off x="276223" y="873405"/>
+            <a:ext cx="11339630" cy="523220"/>
+          </a:xfrm>
+          <a:prstGeom prst="rect">
+            <a:avLst/>
+          </a:prstGeom>
+          <a:noFill/>
+        </p:spPr>
+        <p:txBody>
+          <a:bodyPr wrap="square" rtlCol="0">
+            <a:spAutoFit/>
+          </a:bodyPr>
+          <a:lstStyle/>
+          <a:p>
+            <a:r>
+              <a:rPr lang="en-US" altLang="ko-KR" sz="2800" b="1" spc="100" dirty="0">
+                <a:solidFill>
+                  <a:srgbClr val="44546A"/>
+                </a:solidFill>
+                <a:latin typeface="나눔스퀘어 Bold" panose="020B0600000101010101" pitchFamily="50" charset="-127"/>
+                <a:ea typeface="나눔스퀘어 Bold" panose="020B0600000101010101" pitchFamily="50" charset="-127"/>
+              </a:rPr>
+              <a:t> - </a:t>
+            </a:r>
+            <a:r>
+              <a:rPr lang="ko-KR" altLang="en-US" sz="2800" b="1" spc="100" dirty="0">
+                <a:solidFill>
+                  <a:srgbClr val="44546A"/>
+                </a:solidFill>
+                <a:latin typeface="나눔스퀘어 Bold" panose="020B0600000101010101" pitchFamily="50" charset="-127"/>
+                <a:ea typeface="나눔스퀘어 Bold" panose="020B0600000101010101" pitchFamily="50" charset="-127"/>
+              </a:rPr>
+              <a:t>지역 변수의 생명 주기</a:t>
+            </a:r>
+            <a:endParaRPr lang="en-US" altLang="ko-KR" sz="2800" b="1" spc="100" dirty="0">
+              <a:solidFill>
+                <a:srgbClr val="44546A"/>
+              </a:solidFill>
+              <a:latin typeface="나눔스퀘어 Bold" panose="020B0600000101010101" pitchFamily="50" charset="-127"/>
+              <a:ea typeface="나눔스퀘어 Bold" panose="020B0600000101010101" pitchFamily="50" charset="-127"/>
+            </a:endParaRPr>
+          </a:p>
+        </p:txBody>
+      </p:sp>
     </p:spTree>
     <p:extLst>
       <p:ext uri="{BB962C8B-B14F-4D97-AF65-F5344CB8AC3E}">
@@ -8998,13 +7854,13 @@
   <p:clrMapOvr>
     <a:masterClrMapping/>
   </p:clrMapOvr>
-  <mc:AlternateContent xmlns:mc="http://schemas.openxmlformats.org/markup-compatibility/2006">
-    <mc:Choice xmlns:p159="http://schemas.microsoft.com/office/powerpoint/2015/09/main" Requires="p159">
+  <mc:AlternateContent xmlns:mc="http://schemas.openxmlformats.org/markup-compatibility/2006" xmlns:p159="http://schemas.microsoft.com/office/powerpoint/2015/09/main">
+    <mc:Choice Requires="p159">
       <p:transition xmlns:p14="http://schemas.microsoft.com/office/powerpoint/2010/main" spd="slow" p14:dur="2000">
         <p159:morph option="byObject"/>
       </p:transition>
     </mc:Choice>
-    <mc:Fallback>
+    <mc:Fallback xmlns="">
       <p:transition spd="slow">
         <p:fade/>
       </p:transition>
@@ -9207,10 +8063,10 @@
       </p:cxnSp>
       <p:sp>
         <p:nvSpPr>
-          <p:cNvPr id="17" name="TextBox 16">
-            <a:extLst>
-              <a:ext uri="{FF2B5EF4-FFF2-40B4-BE49-F238E27FC236}">
-                <a16:creationId xmlns:a16="http://schemas.microsoft.com/office/drawing/2014/main" id="{EF93F456-2C49-4A85-B01B-2D6BD46D6E98}"/>
+          <p:cNvPr id="2" name="TextBox 1">
+            <a:extLst>
+              <a:ext uri="{FF2B5EF4-FFF2-40B4-BE49-F238E27FC236}">
+                <a16:creationId xmlns:a16="http://schemas.microsoft.com/office/drawing/2014/main" id="{2EB84E09-966C-F46D-B211-890C52264C2E}"/>
               </a:ext>
             </a:extLst>
           </p:cNvPr>
@@ -9219,8 +8075,8 @@
         </p:nvSpPr>
         <p:spPr>
           <a:xfrm>
-            <a:off x="276223" y="857337"/>
-            <a:ext cx="11339630" cy="523220"/>
+            <a:off x="8802448" y="267286"/>
+            <a:ext cx="1183644" cy="461665"/>
           </a:xfrm>
           <a:prstGeom prst="rect">
             <a:avLst/>
@@ -9233,65 +8089,6 @@
           </a:bodyPr>
           <a:lstStyle/>
           <a:p>
-            <a:pPr algn="ctr"/>
-            <a:r>
-              <a:rPr lang="en-US" altLang="ko-KR" sz="2800" b="1" spc="100" dirty="0">
-                <a:solidFill>
-                  <a:srgbClr val="44546A"/>
-                </a:solidFill>
-                <a:latin typeface="나눔스퀘어 Bold" panose="020B0600000101010101" pitchFamily="50" charset="-127"/>
-                <a:ea typeface="나눔스퀘어 Bold" panose="020B0600000101010101" pitchFamily="50" charset="-127"/>
-              </a:rPr>
-              <a:t>14.1.1</a:t>
-            </a:r>
-            <a:r>
-              <a:rPr lang="ko-KR" altLang="en-US" sz="2800" b="1" spc="100" dirty="0">
-                <a:solidFill>
-                  <a:srgbClr val="44546A"/>
-                </a:solidFill>
-                <a:latin typeface="나눔스퀘어 Bold" panose="020B0600000101010101" pitchFamily="50" charset="-127"/>
-                <a:ea typeface="나눔스퀘어 Bold" panose="020B0600000101010101" pitchFamily="50" charset="-127"/>
-              </a:rPr>
-              <a:t> 지역 변수의 생명 주기</a:t>
-            </a:r>
-            <a:endParaRPr lang="en-US" altLang="ko-KR" sz="2800" b="1" spc="100" dirty="0">
-              <a:solidFill>
-                <a:srgbClr val="44546A"/>
-              </a:solidFill>
-              <a:latin typeface="나눔스퀘어 Bold" panose="020B0600000101010101" pitchFamily="50" charset="-127"/>
-              <a:ea typeface="나눔스퀘어 Bold" panose="020B0600000101010101" pitchFamily="50" charset="-127"/>
-            </a:endParaRPr>
-          </a:p>
-        </p:txBody>
-      </p:sp>
-      <p:sp>
-        <p:nvSpPr>
-          <p:cNvPr id="2" name="TextBox 1">
-            <a:extLst>
-              <a:ext uri="{FF2B5EF4-FFF2-40B4-BE49-F238E27FC236}">
-                <a16:creationId xmlns:a16="http://schemas.microsoft.com/office/drawing/2014/main" id="{2EB84E09-966C-F46D-B211-890C52264C2E}"/>
-              </a:ext>
-            </a:extLst>
-          </p:cNvPr>
-          <p:cNvSpPr txBox="1"/>
-          <p:nvPr/>
-        </p:nvSpPr>
-        <p:spPr>
-          <a:xfrm>
-            <a:off x="8802448" y="267286"/>
-            <a:ext cx="1183644" cy="461665"/>
-          </a:xfrm>
-          <a:prstGeom prst="rect">
-            <a:avLst/>
-          </a:prstGeom>
-          <a:noFill/>
-        </p:spPr>
-        <p:txBody>
-          <a:bodyPr wrap="square" rtlCol="0">
-            <a:spAutoFit/>
-          </a:bodyPr>
-          <a:lstStyle/>
-          <a:p>
             <a:r>
               <a:rPr lang="en-US" altLang="ko-KR" sz="2400" spc="100" dirty="0">
                 <a:solidFill>
@@ -9320,7 +8117,7 @@
                 <a:latin typeface="나눔스퀘어 Bold" panose="020B0600000101010101" pitchFamily="50" charset="-127"/>
                 <a:ea typeface="나눔스퀘어 Bold" panose="020B0600000101010101" pitchFamily="50" charset="-127"/>
               </a:rPr>
-              <a:t>203</a:t>
+              <a:t>201</a:t>
             </a:r>
             <a:endParaRPr lang="ko-KR" altLang="en-US" sz="2400" spc="100" dirty="0">
               <a:solidFill>
@@ -9861,6 +8658,64 @@
           </a:p>
         </p:txBody>
       </p:sp>
+      <p:sp>
+        <p:nvSpPr>
+          <p:cNvPr id="4" name="TextBox 3">
+            <a:extLst>
+              <a:ext uri="{FF2B5EF4-FFF2-40B4-BE49-F238E27FC236}">
+                <a16:creationId xmlns:a16="http://schemas.microsoft.com/office/drawing/2014/main" id="{E071835A-9C89-6EEC-ADCF-3978E64AF28A}"/>
+              </a:ext>
+            </a:extLst>
+          </p:cNvPr>
+          <p:cNvSpPr txBox="1"/>
+          <p:nvPr/>
+        </p:nvSpPr>
+        <p:spPr>
+          <a:xfrm>
+            <a:off x="276223" y="873405"/>
+            <a:ext cx="11339630" cy="523220"/>
+          </a:xfrm>
+          <a:prstGeom prst="rect">
+            <a:avLst/>
+          </a:prstGeom>
+          <a:noFill/>
+        </p:spPr>
+        <p:txBody>
+          <a:bodyPr wrap="square" rtlCol="0">
+            <a:spAutoFit/>
+          </a:bodyPr>
+          <a:lstStyle/>
+          <a:p>
+            <a:r>
+              <a:rPr lang="en-US" altLang="ko-KR" sz="2800" b="1" spc="100" dirty="0">
+                <a:solidFill>
+                  <a:srgbClr val="44546A"/>
+                </a:solidFill>
+                <a:latin typeface="나눔스퀘어 Bold" panose="020B0600000101010101" pitchFamily="50" charset="-127"/>
+                <a:ea typeface="나눔스퀘어 Bold" panose="020B0600000101010101" pitchFamily="50" charset="-127"/>
+              </a:rPr>
+              <a:t> - </a:t>
+            </a:r>
+            <a:r>
+              <a:rPr lang="ko-KR" altLang="en-US" sz="2800" b="1" spc="100" dirty="0">
+                <a:solidFill>
+                  <a:srgbClr val="44546A"/>
+                </a:solidFill>
+                <a:latin typeface="나눔스퀘어 Bold" panose="020B0600000101010101" pitchFamily="50" charset="-127"/>
+                <a:ea typeface="나눔스퀘어 Bold" panose="020B0600000101010101" pitchFamily="50" charset="-127"/>
+              </a:rPr>
+              <a:t>지역 변수의 생명 주기</a:t>
+            </a:r>
+            <a:endParaRPr lang="en-US" altLang="ko-KR" sz="2800" b="1" spc="100" dirty="0">
+              <a:solidFill>
+                <a:srgbClr val="44546A"/>
+              </a:solidFill>
+              <a:latin typeface="나눔스퀘어 Bold" panose="020B0600000101010101" pitchFamily="50" charset="-127"/>
+              <a:ea typeface="나눔스퀘어 Bold" panose="020B0600000101010101" pitchFamily="50" charset="-127"/>
+            </a:endParaRPr>
+          </a:p>
+        </p:txBody>
+      </p:sp>
     </p:spTree>
     <p:extLst>
       <p:ext uri="{BB962C8B-B14F-4D97-AF65-F5344CB8AC3E}">
@@ -9871,13 +8726,13 @@
   <p:clrMapOvr>
     <a:masterClrMapping/>
   </p:clrMapOvr>
-  <mc:AlternateContent xmlns:mc="http://schemas.openxmlformats.org/markup-compatibility/2006">
-    <mc:Choice xmlns:p159="http://schemas.microsoft.com/office/powerpoint/2015/09/main" Requires="p159">
+  <mc:AlternateContent xmlns:mc="http://schemas.openxmlformats.org/markup-compatibility/2006" xmlns:p159="http://schemas.microsoft.com/office/powerpoint/2015/09/main">
+    <mc:Choice Requires="p159">
       <p:transition xmlns:p14="http://schemas.microsoft.com/office/powerpoint/2010/main" spd="slow" p14:dur="2000">
         <p159:morph option="byObject"/>
       </p:transition>
     </mc:Choice>
-    <mc:Fallback>
+    <mc:Fallback xmlns="">
       <p:transition spd="slow">
         <p:fade/>
       </p:transition>
@@ -10080,10 +8935,10 @@
       </p:cxnSp>
       <p:sp>
         <p:nvSpPr>
-          <p:cNvPr id="17" name="TextBox 16">
-            <a:extLst>
-              <a:ext uri="{FF2B5EF4-FFF2-40B4-BE49-F238E27FC236}">
-                <a16:creationId xmlns:a16="http://schemas.microsoft.com/office/drawing/2014/main" id="{EF93F456-2C49-4A85-B01B-2D6BD46D6E98}"/>
+          <p:cNvPr id="2" name="TextBox 1">
+            <a:extLst>
+              <a:ext uri="{FF2B5EF4-FFF2-40B4-BE49-F238E27FC236}">
+                <a16:creationId xmlns:a16="http://schemas.microsoft.com/office/drawing/2014/main" id="{2EB84E09-966C-F46D-B211-890C52264C2E}"/>
               </a:ext>
             </a:extLst>
           </p:cNvPr>
@@ -10092,8 +8947,8 @@
         </p:nvSpPr>
         <p:spPr>
           <a:xfrm>
-            <a:off x="276223" y="857337"/>
-            <a:ext cx="11339630" cy="523220"/>
+            <a:off x="8802448" y="267286"/>
+            <a:ext cx="1183644" cy="461665"/>
           </a:xfrm>
           <a:prstGeom prst="rect">
             <a:avLst/>
@@ -10106,65 +8961,6 @@
           </a:bodyPr>
           <a:lstStyle/>
           <a:p>
-            <a:pPr algn="ctr"/>
-            <a:r>
-              <a:rPr lang="en-US" altLang="ko-KR" sz="2800" b="1" spc="100" dirty="0">
-                <a:solidFill>
-                  <a:srgbClr val="44546A"/>
-                </a:solidFill>
-                <a:latin typeface="나눔스퀘어 Bold" panose="020B0600000101010101" pitchFamily="50" charset="-127"/>
-                <a:ea typeface="나눔스퀘어 Bold" panose="020B0600000101010101" pitchFamily="50" charset="-127"/>
-              </a:rPr>
-              <a:t>14.1.1</a:t>
-            </a:r>
-            <a:r>
-              <a:rPr lang="ko-KR" altLang="en-US" sz="2800" b="1" spc="100" dirty="0">
-                <a:solidFill>
-                  <a:srgbClr val="44546A"/>
-                </a:solidFill>
-                <a:latin typeface="나눔스퀘어 Bold" panose="020B0600000101010101" pitchFamily="50" charset="-127"/>
-                <a:ea typeface="나눔스퀘어 Bold" panose="020B0600000101010101" pitchFamily="50" charset="-127"/>
-              </a:rPr>
-              <a:t> 지역 변수의 생명 주기</a:t>
-            </a:r>
-            <a:endParaRPr lang="en-US" altLang="ko-KR" sz="2800" b="1" spc="100" dirty="0">
-              <a:solidFill>
-                <a:srgbClr val="44546A"/>
-              </a:solidFill>
-              <a:latin typeface="나눔스퀘어 Bold" panose="020B0600000101010101" pitchFamily="50" charset="-127"/>
-              <a:ea typeface="나눔스퀘어 Bold" panose="020B0600000101010101" pitchFamily="50" charset="-127"/>
-            </a:endParaRPr>
-          </a:p>
-        </p:txBody>
-      </p:sp>
-      <p:sp>
-        <p:nvSpPr>
-          <p:cNvPr id="2" name="TextBox 1">
-            <a:extLst>
-              <a:ext uri="{FF2B5EF4-FFF2-40B4-BE49-F238E27FC236}">
-                <a16:creationId xmlns:a16="http://schemas.microsoft.com/office/drawing/2014/main" id="{2EB84E09-966C-F46D-B211-890C52264C2E}"/>
-              </a:ext>
-            </a:extLst>
-          </p:cNvPr>
-          <p:cNvSpPr txBox="1"/>
-          <p:nvPr/>
-        </p:nvSpPr>
-        <p:spPr>
-          <a:xfrm>
-            <a:off x="8802448" y="267286"/>
-            <a:ext cx="1183644" cy="461665"/>
-          </a:xfrm>
-          <a:prstGeom prst="rect">
-            <a:avLst/>
-          </a:prstGeom>
-          <a:noFill/>
-        </p:spPr>
-        <p:txBody>
-          <a:bodyPr wrap="square" rtlCol="0">
-            <a:spAutoFit/>
-          </a:bodyPr>
-          <a:lstStyle/>
-          <a:p>
             <a:r>
               <a:rPr lang="en-US" altLang="ko-KR" sz="2400" spc="100" dirty="0">
                 <a:solidFill>
@@ -10193,7 +8989,7 @@
                 <a:latin typeface="나눔스퀘어 Bold" panose="020B0600000101010101" pitchFamily="50" charset="-127"/>
                 <a:ea typeface="나눔스퀘어 Bold" panose="020B0600000101010101" pitchFamily="50" charset="-127"/>
               </a:rPr>
-              <a:t>203</a:t>
+              <a:t>201</a:t>
             </a:r>
             <a:endParaRPr lang="ko-KR" altLang="en-US" sz="2400" spc="100" dirty="0">
               <a:solidFill>
@@ -10509,6 +9305,64 @@
           </a:p>
         </p:txBody>
       </p:sp>
+      <p:sp>
+        <p:nvSpPr>
+          <p:cNvPr id="4" name="TextBox 3">
+            <a:extLst>
+              <a:ext uri="{FF2B5EF4-FFF2-40B4-BE49-F238E27FC236}">
+                <a16:creationId xmlns:a16="http://schemas.microsoft.com/office/drawing/2014/main" id="{E05A99A4-6E38-6A32-1145-1EE101F8DAD0}"/>
+              </a:ext>
+            </a:extLst>
+          </p:cNvPr>
+          <p:cNvSpPr txBox="1"/>
+          <p:nvPr/>
+        </p:nvSpPr>
+        <p:spPr>
+          <a:xfrm>
+            <a:off x="276223" y="873405"/>
+            <a:ext cx="11339630" cy="523220"/>
+          </a:xfrm>
+          <a:prstGeom prst="rect">
+            <a:avLst/>
+          </a:prstGeom>
+          <a:noFill/>
+        </p:spPr>
+        <p:txBody>
+          <a:bodyPr wrap="square" rtlCol="0">
+            <a:spAutoFit/>
+          </a:bodyPr>
+          <a:lstStyle/>
+          <a:p>
+            <a:r>
+              <a:rPr lang="en-US" altLang="ko-KR" sz="2800" b="1" spc="100" dirty="0">
+                <a:solidFill>
+                  <a:srgbClr val="44546A"/>
+                </a:solidFill>
+                <a:latin typeface="나눔스퀘어 Bold" panose="020B0600000101010101" pitchFamily="50" charset="-127"/>
+                <a:ea typeface="나눔스퀘어 Bold" panose="020B0600000101010101" pitchFamily="50" charset="-127"/>
+              </a:rPr>
+              <a:t> - </a:t>
+            </a:r>
+            <a:r>
+              <a:rPr lang="ko-KR" altLang="en-US" sz="2800" b="1" spc="100" dirty="0">
+                <a:solidFill>
+                  <a:srgbClr val="44546A"/>
+                </a:solidFill>
+                <a:latin typeface="나눔스퀘어 Bold" panose="020B0600000101010101" pitchFamily="50" charset="-127"/>
+                <a:ea typeface="나눔스퀘어 Bold" panose="020B0600000101010101" pitchFamily="50" charset="-127"/>
+              </a:rPr>
+              <a:t>지역 변수의 생명 주기</a:t>
+            </a:r>
+            <a:endParaRPr lang="en-US" altLang="ko-KR" sz="2800" b="1" spc="100" dirty="0">
+              <a:solidFill>
+                <a:srgbClr val="44546A"/>
+              </a:solidFill>
+              <a:latin typeface="나눔스퀘어 Bold" panose="020B0600000101010101" pitchFamily="50" charset="-127"/>
+              <a:ea typeface="나눔스퀘어 Bold" panose="020B0600000101010101" pitchFamily="50" charset="-127"/>
+            </a:endParaRPr>
+          </a:p>
+        </p:txBody>
+      </p:sp>
     </p:spTree>
     <p:extLst>
       <p:ext uri="{BB962C8B-B14F-4D97-AF65-F5344CB8AC3E}">
@@ -10519,13 +9373,13 @@
   <p:clrMapOvr>
     <a:masterClrMapping/>
   </p:clrMapOvr>
-  <mc:AlternateContent xmlns:mc="http://schemas.openxmlformats.org/markup-compatibility/2006">
-    <mc:Choice xmlns:p159="http://schemas.microsoft.com/office/powerpoint/2015/09/main" Requires="p159">
+  <mc:AlternateContent xmlns:mc="http://schemas.openxmlformats.org/markup-compatibility/2006" xmlns:p159="http://schemas.microsoft.com/office/powerpoint/2015/09/main">
+    <mc:Choice Requires="p159">
       <p:transition xmlns:p14="http://schemas.microsoft.com/office/powerpoint/2010/main" spd="slow" p14:dur="2000">
         <p159:morph option="byObject"/>
       </p:transition>
     </mc:Choice>
-    <mc:Fallback>
+    <mc:Fallback xmlns="">
       <p:transition spd="slow">
         <p:fade/>
       </p:transition>
@@ -10728,10 +9582,10 @@
       </p:cxnSp>
       <p:sp>
         <p:nvSpPr>
-          <p:cNvPr id="17" name="TextBox 16">
-            <a:extLst>
-              <a:ext uri="{FF2B5EF4-FFF2-40B4-BE49-F238E27FC236}">
-                <a16:creationId xmlns:a16="http://schemas.microsoft.com/office/drawing/2014/main" id="{EF93F456-2C49-4A85-B01B-2D6BD46D6E98}"/>
+          <p:cNvPr id="2" name="TextBox 1">
+            <a:extLst>
+              <a:ext uri="{FF2B5EF4-FFF2-40B4-BE49-F238E27FC236}">
+                <a16:creationId xmlns:a16="http://schemas.microsoft.com/office/drawing/2014/main" id="{2EB84E09-966C-F46D-B211-890C52264C2E}"/>
               </a:ext>
             </a:extLst>
           </p:cNvPr>
@@ -10740,8 +9594,8 @@
         </p:nvSpPr>
         <p:spPr>
           <a:xfrm>
-            <a:off x="276223" y="857337"/>
-            <a:ext cx="11339630" cy="523220"/>
+            <a:off x="8802448" y="267286"/>
+            <a:ext cx="1183644" cy="461665"/>
           </a:xfrm>
           <a:prstGeom prst="rect">
             <a:avLst/>
@@ -10754,65 +9608,6 @@
           </a:bodyPr>
           <a:lstStyle/>
           <a:p>
-            <a:pPr algn="ctr"/>
-            <a:r>
-              <a:rPr lang="en-US" altLang="ko-KR" sz="2800" b="1" spc="100" dirty="0">
-                <a:solidFill>
-                  <a:srgbClr val="44546A"/>
-                </a:solidFill>
-                <a:latin typeface="나눔스퀘어 Bold" panose="020B0600000101010101" pitchFamily="50" charset="-127"/>
-                <a:ea typeface="나눔스퀘어 Bold" panose="020B0600000101010101" pitchFamily="50" charset="-127"/>
-              </a:rPr>
-              <a:t>14.1.1</a:t>
-            </a:r>
-            <a:r>
-              <a:rPr lang="ko-KR" altLang="en-US" sz="2800" b="1" spc="100" dirty="0">
-                <a:solidFill>
-                  <a:srgbClr val="44546A"/>
-                </a:solidFill>
-                <a:latin typeface="나눔스퀘어 Bold" panose="020B0600000101010101" pitchFamily="50" charset="-127"/>
-                <a:ea typeface="나눔스퀘어 Bold" panose="020B0600000101010101" pitchFamily="50" charset="-127"/>
-              </a:rPr>
-              <a:t> 지역 변수의 생명 주기</a:t>
-            </a:r>
-            <a:endParaRPr lang="en-US" altLang="ko-KR" sz="2800" b="1" spc="100" dirty="0">
-              <a:solidFill>
-                <a:srgbClr val="44546A"/>
-              </a:solidFill>
-              <a:latin typeface="나눔스퀘어 Bold" panose="020B0600000101010101" pitchFamily="50" charset="-127"/>
-              <a:ea typeface="나눔스퀘어 Bold" panose="020B0600000101010101" pitchFamily="50" charset="-127"/>
-            </a:endParaRPr>
-          </a:p>
-        </p:txBody>
-      </p:sp>
-      <p:sp>
-        <p:nvSpPr>
-          <p:cNvPr id="2" name="TextBox 1">
-            <a:extLst>
-              <a:ext uri="{FF2B5EF4-FFF2-40B4-BE49-F238E27FC236}">
-                <a16:creationId xmlns:a16="http://schemas.microsoft.com/office/drawing/2014/main" id="{2EB84E09-966C-F46D-B211-890C52264C2E}"/>
-              </a:ext>
-            </a:extLst>
-          </p:cNvPr>
-          <p:cNvSpPr txBox="1"/>
-          <p:nvPr/>
-        </p:nvSpPr>
-        <p:spPr>
-          <a:xfrm>
-            <a:off x="8802448" y="267286"/>
-            <a:ext cx="1183644" cy="461665"/>
-          </a:xfrm>
-          <a:prstGeom prst="rect">
-            <a:avLst/>
-          </a:prstGeom>
-          <a:noFill/>
-        </p:spPr>
-        <p:txBody>
-          <a:bodyPr wrap="square" rtlCol="0">
-            <a:spAutoFit/>
-          </a:bodyPr>
-          <a:lstStyle/>
-          <a:p>
             <a:r>
               <a:rPr lang="en-US" altLang="ko-KR" sz="2400" spc="100" dirty="0">
                 <a:solidFill>
@@ -10841,7 +9636,7 @@
                 <a:latin typeface="나눔스퀘어 Bold" panose="020B0600000101010101" pitchFamily="50" charset="-127"/>
                 <a:ea typeface="나눔스퀘어 Bold" panose="020B0600000101010101" pitchFamily="50" charset="-127"/>
               </a:rPr>
-              <a:t>203</a:t>
+              <a:t>202</a:t>
             </a:r>
             <a:endParaRPr lang="ko-KR" altLang="en-US" sz="2400" spc="100" dirty="0">
               <a:solidFill>
@@ -11145,6 +9940,64 @@
           </a:prstGeom>
         </p:spPr>
       </p:pic>
+      <p:sp>
+        <p:nvSpPr>
+          <p:cNvPr id="4" name="TextBox 3">
+            <a:extLst>
+              <a:ext uri="{FF2B5EF4-FFF2-40B4-BE49-F238E27FC236}">
+                <a16:creationId xmlns:a16="http://schemas.microsoft.com/office/drawing/2014/main" id="{96F74A72-7277-196F-DE4B-7262EC12FC05}"/>
+              </a:ext>
+            </a:extLst>
+          </p:cNvPr>
+          <p:cNvSpPr txBox="1"/>
+          <p:nvPr/>
+        </p:nvSpPr>
+        <p:spPr>
+          <a:xfrm>
+            <a:off x="276223" y="873405"/>
+            <a:ext cx="11339630" cy="523220"/>
+          </a:xfrm>
+          <a:prstGeom prst="rect">
+            <a:avLst/>
+          </a:prstGeom>
+          <a:noFill/>
+        </p:spPr>
+        <p:txBody>
+          <a:bodyPr wrap="square" rtlCol="0">
+            <a:spAutoFit/>
+          </a:bodyPr>
+          <a:lstStyle/>
+          <a:p>
+            <a:r>
+              <a:rPr lang="en-US" altLang="ko-KR" sz="2800" b="1" spc="100" dirty="0">
+                <a:solidFill>
+                  <a:srgbClr val="44546A"/>
+                </a:solidFill>
+                <a:latin typeface="나눔스퀘어 Bold" panose="020B0600000101010101" pitchFamily="50" charset="-127"/>
+                <a:ea typeface="나눔스퀘어 Bold" panose="020B0600000101010101" pitchFamily="50" charset="-127"/>
+              </a:rPr>
+              <a:t> - </a:t>
+            </a:r>
+            <a:r>
+              <a:rPr lang="ko-KR" altLang="en-US" sz="2800" b="1" spc="100" dirty="0">
+                <a:solidFill>
+                  <a:srgbClr val="44546A"/>
+                </a:solidFill>
+                <a:latin typeface="나눔스퀘어 Bold" panose="020B0600000101010101" pitchFamily="50" charset="-127"/>
+                <a:ea typeface="나눔스퀘어 Bold" panose="020B0600000101010101" pitchFamily="50" charset="-127"/>
+              </a:rPr>
+              <a:t>지역 변수의 생명 주기</a:t>
+            </a:r>
+            <a:endParaRPr lang="en-US" altLang="ko-KR" sz="2800" b="1" spc="100" dirty="0">
+              <a:solidFill>
+                <a:srgbClr val="44546A"/>
+              </a:solidFill>
+              <a:latin typeface="나눔스퀘어 Bold" panose="020B0600000101010101" pitchFamily="50" charset="-127"/>
+              <a:ea typeface="나눔스퀘어 Bold" panose="020B0600000101010101" pitchFamily="50" charset="-127"/>
+            </a:endParaRPr>
+          </a:p>
+        </p:txBody>
+      </p:sp>
     </p:spTree>
     <p:extLst>
       <p:ext uri="{BB962C8B-B14F-4D97-AF65-F5344CB8AC3E}">
@@ -11155,13 +10008,13 @@
   <p:clrMapOvr>
     <a:masterClrMapping/>
   </p:clrMapOvr>
-  <mc:AlternateContent xmlns:mc="http://schemas.openxmlformats.org/markup-compatibility/2006">
-    <mc:Choice xmlns:p159="http://schemas.microsoft.com/office/powerpoint/2015/09/main" Requires="p159">
+  <mc:AlternateContent xmlns:mc="http://schemas.openxmlformats.org/markup-compatibility/2006" xmlns:p159="http://schemas.microsoft.com/office/powerpoint/2015/09/main">
+    <mc:Choice Requires="p159">
       <p:transition xmlns:p14="http://schemas.microsoft.com/office/powerpoint/2010/main" spd="slow" p14:dur="2000">
         <p159:morph option="byObject"/>
       </p:transition>
     </mc:Choice>
-    <mc:Fallback>
+    <mc:Fallback xmlns="">
       <p:transition spd="slow">
         <p:fade/>
       </p:transition>
@@ -11364,10 +10217,10 @@
       </p:cxnSp>
       <p:sp>
         <p:nvSpPr>
-          <p:cNvPr id="17" name="TextBox 16">
-            <a:extLst>
-              <a:ext uri="{FF2B5EF4-FFF2-40B4-BE49-F238E27FC236}">
-                <a16:creationId xmlns:a16="http://schemas.microsoft.com/office/drawing/2014/main" id="{EF93F456-2C49-4A85-B01B-2D6BD46D6E98}"/>
+          <p:cNvPr id="2" name="TextBox 1">
+            <a:extLst>
+              <a:ext uri="{FF2B5EF4-FFF2-40B4-BE49-F238E27FC236}">
+                <a16:creationId xmlns:a16="http://schemas.microsoft.com/office/drawing/2014/main" id="{2EB84E09-966C-F46D-B211-890C52264C2E}"/>
               </a:ext>
             </a:extLst>
           </p:cNvPr>
@@ -11376,8 +10229,8 @@
         </p:nvSpPr>
         <p:spPr>
           <a:xfrm>
-            <a:off x="276223" y="857337"/>
-            <a:ext cx="11339630" cy="523220"/>
+            <a:off x="8802448" y="267286"/>
+            <a:ext cx="1183644" cy="461665"/>
           </a:xfrm>
           <a:prstGeom prst="rect">
             <a:avLst/>
@@ -11390,65 +10243,6 @@
           </a:bodyPr>
           <a:lstStyle/>
           <a:p>
-            <a:pPr algn="ctr"/>
-            <a:r>
-              <a:rPr lang="en-US" altLang="ko-KR" sz="2800" b="1" spc="100" dirty="0">
-                <a:solidFill>
-                  <a:srgbClr val="44546A"/>
-                </a:solidFill>
-                <a:latin typeface="나눔스퀘어 Bold" panose="020B0600000101010101" pitchFamily="50" charset="-127"/>
-                <a:ea typeface="나눔스퀘어 Bold" panose="020B0600000101010101" pitchFamily="50" charset="-127"/>
-              </a:rPr>
-              <a:t>14.1.1</a:t>
-            </a:r>
-            <a:r>
-              <a:rPr lang="ko-KR" altLang="en-US" sz="2800" b="1" spc="100" dirty="0">
-                <a:solidFill>
-                  <a:srgbClr val="44546A"/>
-                </a:solidFill>
-                <a:latin typeface="나눔스퀘어 Bold" panose="020B0600000101010101" pitchFamily="50" charset="-127"/>
-                <a:ea typeface="나눔스퀘어 Bold" panose="020B0600000101010101" pitchFamily="50" charset="-127"/>
-              </a:rPr>
-              <a:t> 지역 변수의 생명 주기</a:t>
-            </a:r>
-            <a:endParaRPr lang="en-US" altLang="ko-KR" sz="2800" b="1" spc="100" dirty="0">
-              <a:solidFill>
-                <a:srgbClr val="44546A"/>
-              </a:solidFill>
-              <a:latin typeface="나눔스퀘어 Bold" panose="020B0600000101010101" pitchFamily="50" charset="-127"/>
-              <a:ea typeface="나눔스퀘어 Bold" panose="020B0600000101010101" pitchFamily="50" charset="-127"/>
-            </a:endParaRPr>
-          </a:p>
-        </p:txBody>
-      </p:sp>
-      <p:sp>
-        <p:nvSpPr>
-          <p:cNvPr id="2" name="TextBox 1">
-            <a:extLst>
-              <a:ext uri="{FF2B5EF4-FFF2-40B4-BE49-F238E27FC236}">
-                <a16:creationId xmlns:a16="http://schemas.microsoft.com/office/drawing/2014/main" id="{2EB84E09-966C-F46D-B211-890C52264C2E}"/>
-              </a:ext>
-            </a:extLst>
-          </p:cNvPr>
-          <p:cNvSpPr txBox="1"/>
-          <p:nvPr/>
-        </p:nvSpPr>
-        <p:spPr>
-          <a:xfrm>
-            <a:off x="8802448" y="267286"/>
-            <a:ext cx="1183644" cy="461665"/>
-          </a:xfrm>
-          <a:prstGeom prst="rect">
-            <a:avLst/>
-          </a:prstGeom>
-          <a:noFill/>
-        </p:spPr>
-        <p:txBody>
-          <a:bodyPr wrap="square" rtlCol="0">
-            <a:spAutoFit/>
-          </a:bodyPr>
-          <a:lstStyle/>
-          <a:p>
             <a:r>
               <a:rPr lang="en-US" altLang="ko-KR" sz="2400" spc="100" dirty="0">
                 <a:solidFill>
@@ -11477,7 +10271,7 @@
                 <a:latin typeface="나눔스퀘어 Bold" panose="020B0600000101010101" pitchFamily="50" charset="-127"/>
                 <a:ea typeface="나눔스퀘어 Bold" panose="020B0600000101010101" pitchFamily="50" charset="-127"/>
               </a:rPr>
-              <a:t>203</a:t>
+              <a:t>202</a:t>
             </a:r>
             <a:endParaRPr lang="ko-KR" altLang="en-US" sz="2400" spc="100" dirty="0">
               <a:solidFill>
@@ -11718,6 +10512,64 @@
           </a:p>
         </p:txBody>
       </p:sp>
+      <p:sp>
+        <p:nvSpPr>
+          <p:cNvPr id="4" name="TextBox 3">
+            <a:extLst>
+              <a:ext uri="{FF2B5EF4-FFF2-40B4-BE49-F238E27FC236}">
+                <a16:creationId xmlns:a16="http://schemas.microsoft.com/office/drawing/2014/main" id="{50A5870E-E31A-0C22-E5E9-9DAF14E97A75}"/>
+              </a:ext>
+            </a:extLst>
+          </p:cNvPr>
+          <p:cNvSpPr txBox="1"/>
+          <p:nvPr/>
+        </p:nvSpPr>
+        <p:spPr>
+          <a:xfrm>
+            <a:off x="276223" y="873405"/>
+            <a:ext cx="11339630" cy="523220"/>
+          </a:xfrm>
+          <a:prstGeom prst="rect">
+            <a:avLst/>
+          </a:prstGeom>
+          <a:noFill/>
+        </p:spPr>
+        <p:txBody>
+          <a:bodyPr wrap="square" rtlCol="0">
+            <a:spAutoFit/>
+          </a:bodyPr>
+          <a:lstStyle/>
+          <a:p>
+            <a:r>
+              <a:rPr lang="en-US" altLang="ko-KR" sz="2800" b="1" spc="100" dirty="0">
+                <a:solidFill>
+                  <a:srgbClr val="44546A"/>
+                </a:solidFill>
+                <a:latin typeface="나눔스퀘어 Bold" panose="020B0600000101010101" pitchFamily="50" charset="-127"/>
+                <a:ea typeface="나눔스퀘어 Bold" panose="020B0600000101010101" pitchFamily="50" charset="-127"/>
+              </a:rPr>
+              <a:t> - </a:t>
+            </a:r>
+            <a:r>
+              <a:rPr lang="ko-KR" altLang="en-US" sz="2800" b="1" spc="100" dirty="0">
+                <a:solidFill>
+                  <a:srgbClr val="44546A"/>
+                </a:solidFill>
+                <a:latin typeface="나눔스퀘어 Bold" panose="020B0600000101010101" pitchFamily="50" charset="-127"/>
+                <a:ea typeface="나눔스퀘어 Bold" panose="020B0600000101010101" pitchFamily="50" charset="-127"/>
+              </a:rPr>
+              <a:t>지역 변수의 생명 주기</a:t>
+            </a:r>
+            <a:endParaRPr lang="en-US" altLang="ko-KR" sz="2800" b="1" spc="100" dirty="0">
+              <a:solidFill>
+                <a:srgbClr val="44546A"/>
+              </a:solidFill>
+              <a:latin typeface="나눔스퀘어 Bold" panose="020B0600000101010101" pitchFamily="50" charset="-127"/>
+              <a:ea typeface="나눔스퀘어 Bold" panose="020B0600000101010101" pitchFamily="50" charset="-127"/>
+            </a:endParaRPr>
+          </a:p>
+        </p:txBody>
+      </p:sp>
     </p:spTree>
     <p:extLst>
       <p:ext uri="{BB962C8B-B14F-4D97-AF65-F5344CB8AC3E}">
@@ -11728,13 +10580,13 @@
   <p:clrMapOvr>
     <a:masterClrMapping/>
   </p:clrMapOvr>
-  <mc:AlternateContent xmlns:mc="http://schemas.openxmlformats.org/markup-compatibility/2006">
-    <mc:Choice xmlns:p159="http://schemas.microsoft.com/office/powerpoint/2015/09/main" Requires="p159">
+  <mc:AlternateContent xmlns:mc="http://schemas.openxmlformats.org/markup-compatibility/2006" xmlns:p159="http://schemas.microsoft.com/office/powerpoint/2015/09/main">
+    <mc:Choice Requires="p159">
       <p:transition xmlns:p14="http://schemas.microsoft.com/office/powerpoint/2010/main" spd="slow" p14:dur="2000">
         <p159:morph option="byObject"/>
       </p:transition>
     </mc:Choice>
-    <mc:Fallback>
+    <mc:Fallback xmlns="">
       <p:transition spd="slow">
         <p:fade/>
       </p:transition>
@@ -11963,7 +10815,6 @@
           </a:bodyPr>
           <a:lstStyle/>
           <a:p>
-            <a:pPr algn="ctr"/>
             <a:r>
               <a:rPr lang="en-US" altLang="ko-KR" sz="2800" b="1" spc="100" dirty="0">
                 <a:solidFill>
@@ -11972,7 +10823,7 @@
                 <a:latin typeface="나눔스퀘어 Bold" panose="020B0600000101010101" pitchFamily="50" charset="-127"/>
                 <a:ea typeface="나눔스퀘어 Bold" panose="020B0600000101010101" pitchFamily="50" charset="-127"/>
               </a:rPr>
-              <a:t>14.1.2</a:t>
+              <a:t> -</a:t>
             </a:r>
             <a:r>
               <a:rPr lang="ko-KR" altLang="en-US" sz="2800" b="1" spc="100" dirty="0">
@@ -12050,7 +10901,7 @@
                 <a:latin typeface="나눔스퀘어 Bold" panose="020B0600000101010101" pitchFamily="50" charset="-127"/>
                 <a:ea typeface="나눔스퀘어 Bold" panose="020B0600000101010101" pitchFamily="50" charset="-127"/>
               </a:rPr>
-              <a:t>203</a:t>
+              <a:t>202</a:t>
             </a:r>
             <a:endParaRPr lang="ko-KR" altLang="en-US" sz="2400" spc="100" dirty="0">
               <a:solidFill>
@@ -12394,13 +11245,13 @@
   <p:clrMapOvr>
     <a:masterClrMapping/>
   </p:clrMapOvr>
-  <mc:AlternateContent xmlns:mc="http://schemas.openxmlformats.org/markup-compatibility/2006">
-    <mc:Choice xmlns:p159="http://schemas.microsoft.com/office/powerpoint/2015/09/main" Requires="p159">
+  <mc:AlternateContent xmlns:mc="http://schemas.openxmlformats.org/markup-compatibility/2006" xmlns:p159="http://schemas.microsoft.com/office/powerpoint/2015/09/main">
+    <mc:Choice Requires="p159">
       <p:transition xmlns:p14="http://schemas.microsoft.com/office/powerpoint/2010/main" spd="slow" p14:dur="2000">
         <p159:morph option="byObject"/>
       </p:transition>
     </mc:Choice>
-    <mc:Fallback>
+    <mc:Fallback xmlns="">
       <p:transition spd="slow">
         <p:fade/>
       </p:transition>

</xml_diff>